<commit_message>
Atualizando aula 5 de dispositivos móveis e adicionando questionário
</commit_message>
<xml_diff>
--- a/Eugenio Mariz de Oliveira Netto/Programação de Aplicativos Mobile II/Aula 5/WebApps.pptx
+++ b/Eugenio Mariz de Oliveira Netto/Programação de Aplicativos Mobile II/Aula 5/WebApps.pptx
@@ -21,6 +21,12 @@
     <p:sldId id="270" r:id="rId15"/>
     <p:sldId id="271" r:id="rId16"/>
     <p:sldId id="272" r:id="rId17"/>
+    <p:sldId id="273" r:id="rId18"/>
+    <p:sldId id="274" r:id="rId19"/>
+    <p:sldId id="275" r:id="rId20"/>
+    <p:sldId id="276" r:id="rId21"/>
+    <p:sldId id="277" r:id="rId22"/>
+    <p:sldId id="278" r:id="rId23"/>
   </p:sldIdLst>
   <p:sldSz cx="12192000" cy="6858000"/>
   <p:notesSz cx="6858000" cy="9144000"/>
@@ -4162,11 +4168,7 @@
             </a:r>
             <a:r>
               <a:rPr lang="pt-BR" sz="2400" i="1" dirty="0"/>
-              <a:t>Service </a:t>
-            </a:r>
-            <a:r>
-              <a:rPr lang="pt-BR" sz="2400" i="1" dirty="0" err="1"/>
-              <a:t>Worker</a:t>
+              <a:t>Service Worker</a:t>
             </a:r>
             <a:r>
               <a:rPr lang="pt-BR" sz="2400" dirty="0"/>
@@ -5206,11 +5208,7 @@
             </a:r>
             <a:r>
               <a:rPr lang="pt-BR" sz="2400" i="1" dirty="0"/>
-              <a:t>Service </a:t>
-            </a:r>
-            <a:r>
-              <a:rPr lang="pt-BR" sz="2400" i="1" dirty="0" err="1"/>
-              <a:t>Worker</a:t>
+              <a:t>Service Worker</a:t>
             </a:r>
             <a:r>
               <a:rPr lang="pt-BR" sz="2400" dirty="0"/>
@@ -5235,11 +5233,7 @@
             </a:r>
             <a:r>
               <a:rPr lang="pt-BR" sz="2400" i="1" dirty="0"/>
-              <a:t>Service </a:t>
-            </a:r>
-            <a:r>
-              <a:rPr lang="pt-BR" sz="2400" i="1" dirty="0" err="1"/>
-              <a:t>Worker</a:t>
+              <a:t>Service Worker</a:t>
             </a:r>
             <a:r>
               <a:rPr lang="pt-BR" sz="2400" dirty="0"/>
@@ -5257,11 +5251,7 @@
             </a:r>
             <a:r>
               <a:rPr lang="pt-BR" sz="2200" i="1" dirty="0"/>
-              <a:t>Service </a:t>
-            </a:r>
-            <a:r>
-              <a:rPr lang="pt-BR" sz="2200" i="1" dirty="0" err="1"/>
-              <a:t>Worker</a:t>
+              <a:t>Service Worker</a:t>
             </a:r>
             <a:r>
               <a:rPr lang="pt-BR" sz="2200" dirty="0"/>
@@ -5284,11 +5274,7 @@
             </a:r>
             <a:r>
               <a:rPr lang="pt-BR" sz="2200" i="1" dirty="0"/>
-              <a:t>Service </a:t>
-            </a:r>
-            <a:r>
-              <a:rPr lang="pt-BR" sz="2200" i="1" dirty="0" err="1"/>
-              <a:t>Worker</a:t>
+              <a:t>Service Worker</a:t>
             </a:r>
             <a:r>
               <a:rPr lang="pt-BR" sz="2200" dirty="0"/>
@@ -6023,6 +6009,1991 @@
 </p:sld>
 </file>
 
+<file path=ppt/slides/slide17.xml><?xml version="1.0" encoding="utf-8"?>
+<p:sld xmlns:a="http://schemas.openxmlformats.org/drawingml/2006/main" xmlns:r="http://schemas.openxmlformats.org/officeDocument/2006/relationships" xmlns:p="http://schemas.openxmlformats.org/presentationml/2006/main">
+  <p:cSld>
+    <p:spTree>
+      <p:nvGrpSpPr>
+        <p:cNvPr id="1" name=""/>
+        <p:cNvGrpSpPr/>
+        <p:nvPr/>
+      </p:nvGrpSpPr>
+      <p:grpSpPr>
+        <a:xfrm>
+          <a:off x="0" y="0"/>
+          <a:ext cx="0" cy="0"/>
+          <a:chOff x="0" y="0"/>
+          <a:chExt cx="0" cy="0"/>
+        </a:xfrm>
+      </p:grpSpPr>
+      <p:sp>
+        <p:nvSpPr>
+          <p:cNvPr id="2" name="Título 1">
+            <a:extLst>
+              <a:ext uri="{FF2B5EF4-FFF2-40B4-BE49-F238E27FC236}">
+                <a16:creationId xmlns:a16="http://schemas.microsoft.com/office/drawing/2014/main" id="{F7649200-3852-7866-2E3C-AB07108150A8}"/>
+              </a:ext>
+            </a:extLst>
+          </p:cNvPr>
+          <p:cNvSpPr>
+            <a:spLocks noGrp="1"/>
+          </p:cNvSpPr>
+          <p:nvPr>
+            <p:ph type="title"/>
+          </p:nvPr>
+        </p:nvSpPr>
+        <p:spPr/>
+        <p:txBody>
+          <a:bodyPr/>
+          <a:lstStyle/>
+          <a:p>
+            <a:r>
+              <a:rPr lang="pt-BR" dirty="0"/>
+              <a:t>Transformando um</a:t>
+            </a:r>
+            <a:r>
+              <a:rPr lang="pt-BR" i="1" dirty="0"/>
+              <a:t> site</a:t>
+            </a:r>
+            <a:r>
+              <a:rPr lang="pt-BR" dirty="0"/>
+              <a:t> em um </a:t>
+            </a:r>
+            <a:r>
+              <a:rPr lang="pt-BR" dirty="0" err="1"/>
+              <a:t>WebApp</a:t>
+            </a:r>
+            <a:br>
+              <a:rPr lang="pt-BR" dirty="0"/>
+            </a:br>
+            <a:r>
+              <a:rPr lang="pt-BR" sz="2400" dirty="0"/>
+              <a:t>ATIVAR O SERVICE WORKER</a:t>
+            </a:r>
+            <a:endParaRPr lang="pt-BR" sz="2400" i="1" dirty="0"/>
+          </a:p>
+        </p:txBody>
+      </p:sp>
+      <p:sp>
+        <p:nvSpPr>
+          <p:cNvPr id="3" name="Espaço Reservado para Conteúdo 2">
+            <a:extLst>
+              <a:ext uri="{FF2B5EF4-FFF2-40B4-BE49-F238E27FC236}">
+                <a16:creationId xmlns:a16="http://schemas.microsoft.com/office/drawing/2014/main" id="{BC621189-6CC5-D3DF-91C1-80746A497F29}"/>
+              </a:ext>
+            </a:extLst>
+          </p:cNvPr>
+          <p:cNvSpPr>
+            <a:spLocks noGrp="1"/>
+          </p:cNvSpPr>
+          <p:nvPr>
+            <p:ph idx="1"/>
+          </p:nvPr>
+        </p:nvSpPr>
+        <p:spPr>
+          <a:xfrm>
+            <a:off x="496476" y="1896397"/>
+            <a:ext cx="4144535" cy="4023360"/>
+          </a:xfrm>
+        </p:spPr>
+        <p:txBody>
+          <a:bodyPr>
+            <a:normAutofit/>
+          </a:bodyPr>
+          <a:lstStyle/>
+          <a:p>
+            <a:pPr marL="0" indent="0">
+              <a:buNone/>
+            </a:pPr>
+            <a:r>
+              <a:rPr lang="pt-BR" sz="2400" dirty="0"/>
+              <a:t>Esta etapa é a continuação do arquivo que foi criado anteriormente.</a:t>
+            </a:r>
+          </a:p>
+          <a:p>
+            <a:pPr marL="0" indent="0">
+              <a:buNone/>
+            </a:pPr>
+            <a:r>
+              <a:rPr lang="pt-BR" sz="2400" dirty="0"/>
+              <a:t>Conforme o nome, este trecho permite que o </a:t>
+            </a:r>
+            <a:r>
+              <a:rPr lang="pt-BR" sz="2400" i="1" dirty="0"/>
+              <a:t>Service Worker</a:t>
+            </a:r>
+            <a:r>
+              <a:rPr lang="pt-BR" sz="2400" dirty="0"/>
+              <a:t> seja ativado. Mesmo instalado o </a:t>
+            </a:r>
+            <a:r>
+              <a:rPr lang="pt-BR" sz="2400" i="1" dirty="0"/>
+              <a:t>Service Worker</a:t>
+            </a:r>
+            <a:r>
+              <a:rPr lang="pt-BR" sz="2400" dirty="0"/>
+              <a:t> pode não estar ativo, mas pode ser </a:t>
+            </a:r>
+            <a:r>
+              <a:rPr lang="pt-BR" sz="2400" dirty="0" err="1"/>
+              <a:t>ativade</a:t>
+            </a:r>
+            <a:r>
+              <a:rPr lang="pt-BR" sz="2400" dirty="0"/>
+              <a:t> a partir de um comando especifico for realizado.</a:t>
+            </a:r>
+          </a:p>
+        </p:txBody>
+      </p:sp>
+      <p:sp>
+        <p:nvSpPr>
+          <p:cNvPr id="5" name="CaixaDeTexto 4">
+            <a:extLst>
+              <a:ext uri="{FF2B5EF4-FFF2-40B4-BE49-F238E27FC236}">
+                <a16:creationId xmlns:a16="http://schemas.microsoft.com/office/drawing/2014/main" id="{078F35EF-23B6-D274-A187-21B7A0DB837B}"/>
+              </a:ext>
+            </a:extLst>
+          </p:cNvPr>
+          <p:cNvSpPr txBox="1"/>
+          <p:nvPr/>
+        </p:nvSpPr>
+        <p:spPr>
+          <a:xfrm>
+            <a:off x="4641011" y="1737360"/>
+            <a:ext cx="7401464" cy="4524315"/>
+          </a:xfrm>
+          <a:prstGeom prst="rect">
+            <a:avLst/>
+          </a:prstGeom>
+          <a:noFill/>
+        </p:spPr>
+        <p:txBody>
+          <a:bodyPr wrap="square" rtlCol="0">
+            <a:spAutoFit/>
+          </a:bodyPr>
+          <a:lstStyle/>
+          <a:p>
+            <a:r>
+              <a:rPr lang="pt-BR" sz="1600" dirty="0">
+                <a:solidFill>
+                  <a:schemeClr val="tx1">
+                    <a:lumMod val="50000"/>
+                    <a:lumOff val="50000"/>
+                  </a:schemeClr>
+                </a:solidFill>
+                <a:latin typeface="Consolas" panose="020B0609020204030204" pitchFamily="49" charset="0"/>
+              </a:rPr>
+              <a:t>1</a:t>
+            </a:r>
+            <a:r>
+              <a:rPr lang="pt-BR" sz="1600" dirty="0">
+                <a:latin typeface="Consolas" panose="020B0609020204030204" pitchFamily="49" charset="0"/>
+              </a:rPr>
+              <a:t>  </a:t>
+            </a:r>
+            <a:r>
+              <a:rPr lang="pt-BR" sz="1600" dirty="0">
+                <a:solidFill>
+                  <a:srgbClr val="FF0000"/>
+                </a:solidFill>
+                <a:latin typeface="Consolas" panose="020B0609020204030204" pitchFamily="49" charset="0"/>
+              </a:rPr>
+              <a:t>var </a:t>
+            </a:r>
+            <a:r>
+              <a:rPr lang="pt-BR" sz="1600" dirty="0">
+                <a:solidFill>
+                  <a:srgbClr val="0070C0"/>
+                </a:solidFill>
+                <a:latin typeface="Consolas" panose="020B0609020204030204" pitchFamily="49" charset="0"/>
+              </a:rPr>
+              <a:t>CACHE_NAME </a:t>
+            </a:r>
+            <a:r>
+              <a:rPr lang="pt-BR" sz="1600" dirty="0">
+                <a:latin typeface="Consolas" panose="020B0609020204030204" pitchFamily="49" charset="0"/>
+              </a:rPr>
+              <a:t>= “static-v1”; </a:t>
+            </a:r>
+          </a:p>
+          <a:p>
+            <a:r>
+              <a:rPr lang="pt-BR" sz="1600" dirty="0">
+                <a:solidFill>
+                  <a:schemeClr val="tx1">
+                    <a:lumMod val="50000"/>
+                    <a:lumOff val="50000"/>
+                  </a:schemeClr>
+                </a:solidFill>
+                <a:latin typeface="Consolas" panose="020B0609020204030204" pitchFamily="49" charset="0"/>
+              </a:rPr>
+              <a:t>2</a:t>
+            </a:r>
+            <a:r>
+              <a:rPr lang="pt-BR" sz="1600" dirty="0">
+                <a:latin typeface="Consolas" panose="020B0609020204030204" pitchFamily="49" charset="0"/>
+              </a:rPr>
+              <a:t>	</a:t>
+            </a:r>
+          </a:p>
+          <a:p>
+            <a:r>
+              <a:rPr lang="pt-BR" sz="1600" dirty="0">
+                <a:solidFill>
+                  <a:schemeClr val="tx1">
+                    <a:lumMod val="50000"/>
+                    <a:lumOff val="50000"/>
+                  </a:schemeClr>
+                </a:solidFill>
+                <a:latin typeface="Consolas" panose="020B0609020204030204" pitchFamily="49" charset="0"/>
+              </a:rPr>
+              <a:t>3  </a:t>
+            </a:r>
+            <a:r>
+              <a:rPr lang="pt-BR" sz="1600" dirty="0">
+                <a:latin typeface="Consolas" panose="020B0609020204030204" pitchFamily="49" charset="0"/>
+              </a:rPr>
+              <a:t>self.</a:t>
+            </a:r>
+            <a:r>
+              <a:rPr lang="pt-BR" sz="1600" dirty="0">
+                <a:solidFill>
+                  <a:srgbClr val="7030A0"/>
+                </a:solidFill>
+                <a:latin typeface="Consolas" panose="020B0609020204030204" pitchFamily="49" charset="0"/>
+              </a:rPr>
+              <a:t>addEventListener</a:t>
+            </a:r>
+            <a:r>
+              <a:rPr lang="pt-BR" sz="1600" dirty="0">
+                <a:latin typeface="Consolas" panose="020B0609020204030204" pitchFamily="49" charset="0"/>
+              </a:rPr>
+              <a:t>(‘activate’, </a:t>
+            </a:r>
+            <a:r>
+              <a:rPr lang="pt-BR" sz="1600" dirty="0">
+                <a:solidFill>
+                  <a:srgbClr val="FF0000"/>
+                </a:solidFill>
+                <a:latin typeface="Consolas" panose="020B0609020204030204" pitchFamily="49" charset="0"/>
+              </a:rPr>
+              <a:t>function </a:t>
+            </a:r>
+            <a:r>
+              <a:rPr lang="pt-BR" sz="1600" dirty="0">
+                <a:solidFill>
+                  <a:srgbClr val="7030A0"/>
+                </a:solidFill>
+                <a:latin typeface="Consolas" panose="020B0609020204030204" pitchFamily="49" charset="0"/>
+              </a:rPr>
+              <a:t>activator</a:t>
+            </a:r>
+            <a:r>
+              <a:rPr lang="pt-BR" sz="1600" dirty="0">
+                <a:latin typeface="Consolas" panose="020B0609020204030204" pitchFamily="49" charset="0"/>
+              </a:rPr>
+              <a:t>(event) {</a:t>
+            </a:r>
+          </a:p>
+          <a:p>
+            <a:r>
+              <a:rPr lang="pt-BR" sz="1600" dirty="0">
+                <a:solidFill>
+                  <a:schemeClr val="tx1">
+                    <a:lumMod val="50000"/>
+                    <a:lumOff val="50000"/>
+                  </a:schemeClr>
+                </a:solidFill>
+                <a:latin typeface="Consolas" panose="020B0609020204030204" pitchFamily="49" charset="0"/>
+              </a:rPr>
+              <a:t>4</a:t>
+            </a:r>
+            <a:r>
+              <a:rPr lang="pt-BR" sz="1600" dirty="0">
+                <a:latin typeface="Consolas" panose="020B0609020204030204" pitchFamily="49" charset="0"/>
+              </a:rPr>
+              <a:t>		event.</a:t>
+            </a:r>
+            <a:r>
+              <a:rPr lang="pt-BR" sz="1600" dirty="0">
+                <a:solidFill>
+                  <a:srgbClr val="7030A0"/>
+                </a:solidFill>
+                <a:latin typeface="Consolas" panose="020B0609020204030204" pitchFamily="49" charset="0"/>
+              </a:rPr>
+              <a:t>waitUntil</a:t>
+            </a:r>
+            <a:r>
+              <a:rPr lang="pt-BR" sz="1600" dirty="0">
+                <a:latin typeface="Consolas" panose="020B0609020204030204" pitchFamily="49" charset="0"/>
+              </a:rPr>
+              <a:t>(</a:t>
+            </a:r>
+          </a:p>
+          <a:p>
+            <a:r>
+              <a:rPr lang="pt-BR" sz="1600" dirty="0">
+                <a:solidFill>
+                  <a:schemeClr val="tx1">
+                    <a:lumMod val="50000"/>
+                    <a:lumOff val="50000"/>
+                  </a:schemeClr>
+                </a:solidFill>
+                <a:latin typeface="Consolas" panose="020B0609020204030204" pitchFamily="49" charset="0"/>
+              </a:rPr>
+              <a:t>5</a:t>
+            </a:r>
+            <a:r>
+              <a:rPr lang="pt-BR" sz="1600" dirty="0">
+                <a:latin typeface="Consolas" panose="020B0609020204030204" pitchFamily="49" charset="0"/>
+              </a:rPr>
+              <a:t>			caches.</a:t>
+            </a:r>
+            <a:r>
+              <a:rPr lang="pt-BR" sz="1600" dirty="0">
+                <a:solidFill>
+                  <a:srgbClr val="7030A0"/>
+                </a:solidFill>
+                <a:latin typeface="Consolas" panose="020B0609020204030204" pitchFamily="49" charset="0"/>
+              </a:rPr>
+              <a:t>keys</a:t>
+            </a:r>
+            <a:r>
+              <a:rPr lang="pt-BR" sz="1600" dirty="0">
+                <a:latin typeface="Consolas" panose="020B0609020204030204" pitchFamily="49" charset="0"/>
+              </a:rPr>
+              <a:t>().</a:t>
+            </a:r>
+            <a:r>
+              <a:rPr lang="pt-BR" sz="1600" dirty="0">
+                <a:solidFill>
+                  <a:srgbClr val="7030A0"/>
+                </a:solidFill>
+                <a:latin typeface="Consolas" panose="020B0609020204030204" pitchFamily="49" charset="0"/>
+              </a:rPr>
+              <a:t>then</a:t>
+            </a:r>
+            <a:r>
+              <a:rPr lang="pt-BR" sz="1600" dirty="0">
+                <a:latin typeface="Consolas" panose="020B0609020204030204" pitchFamily="49" charset="0"/>
+              </a:rPr>
+              <a:t>(</a:t>
+            </a:r>
+            <a:r>
+              <a:rPr lang="pt-BR" sz="1600" dirty="0">
+                <a:solidFill>
+                  <a:srgbClr val="FF0000"/>
+                </a:solidFill>
+                <a:latin typeface="Consolas" panose="020B0609020204030204" pitchFamily="49" charset="0"/>
+              </a:rPr>
+              <a:t>function</a:t>
+            </a:r>
+            <a:r>
+              <a:rPr lang="pt-BR" sz="1600" dirty="0">
+                <a:latin typeface="Consolas" panose="020B0609020204030204" pitchFamily="49" charset="0"/>
+              </a:rPr>
+              <a:t> (keys) {</a:t>
+            </a:r>
+          </a:p>
+          <a:p>
+            <a:r>
+              <a:rPr lang="pt-BR" sz="1600" dirty="0">
+                <a:solidFill>
+                  <a:schemeClr val="tx1">
+                    <a:lumMod val="50000"/>
+                    <a:lumOff val="50000"/>
+                  </a:schemeClr>
+                </a:solidFill>
+                <a:latin typeface="Consolas" panose="020B0609020204030204" pitchFamily="49" charset="0"/>
+              </a:rPr>
+              <a:t>6</a:t>
+            </a:r>
+            <a:r>
+              <a:rPr lang="pt-BR" sz="1600" dirty="0">
+                <a:latin typeface="Consolas" panose="020B0609020204030204" pitchFamily="49" charset="0"/>
+              </a:rPr>
+              <a:t>				</a:t>
+            </a:r>
+            <a:r>
+              <a:rPr lang="pt-BR" sz="1600" dirty="0">
+                <a:solidFill>
+                  <a:srgbClr val="FF0000"/>
+                </a:solidFill>
+                <a:latin typeface="Consolas" panose="020B0609020204030204" pitchFamily="49" charset="0"/>
+              </a:rPr>
+              <a:t>return</a:t>
+            </a:r>
+            <a:r>
+              <a:rPr lang="pt-BR" sz="1600" dirty="0">
+                <a:latin typeface="Consolas" panose="020B0609020204030204" pitchFamily="49" charset="0"/>
+              </a:rPr>
+              <a:t> </a:t>
+            </a:r>
+            <a:r>
+              <a:rPr lang="pt-BR" sz="1600" dirty="0">
+                <a:solidFill>
+                  <a:srgbClr val="FF0000"/>
+                </a:solidFill>
+                <a:latin typeface="Consolas" panose="020B0609020204030204" pitchFamily="49" charset="0"/>
+              </a:rPr>
+              <a:t>Promise</a:t>
+            </a:r>
+            <a:r>
+              <a:rPr lang="pt-BR" sz="1600" dirty="0">
+                <a:latin typeface="Consolas" panose="020B0609020204030204" pitchFamily="49" charset="0"/>
+              </a:rPr>
+              <a:t>.</a:t>
+            </a:r>
+            <a:r>
+              <a:rPr lang="pt-BR" sz="1600" dirty="0">
+                <a:solidFill>
+                  <a:srgbClr val="7030A0"/>
+                </a:solidFill>
+                <a:latin typeface="Consolas" panose="020B0609020204030204" pitchFamily="49" charset="0"/>
+              </a:rPr>
+              <a:t>all</a:t>
+            </a:r>
+            <a:r>
+              <a:rPr lang="pt-BR" sz="1600" dirty="0">
+                <a:latin typeface="Consolas" panose="020B0609020204030204" pitchFamily="49" charset="0"/>
+              </a:rPr>
+              <a:t>(keys</a:t>
+            </a:r>
+          </a:p>
+          <a:p>
+            <a:r>
+              <a:rPr lang="pt-BR" sz="1600" dirty="0">
+                <a:solidFill>
+                  <a:schemeClr val="tx1">
+                    <a:lumMod val="50000"/>
+                    <a:lumOff val="50000"/>
+                  </a:schemeClr>
+                </a:solidFill>
+                <a:latin typeface="Consolas" panose="020B0609020204030204" pitchFamily="49" charset="0"/>
+              </a:rPr>
+              <a:t>7</a:t>
+            </a:r>
+            <a:r>
+              <a:rPr lang="pt-BR" sz="1600" dirty="0">
+                <a:latin typeface="Consolas" panose="020B0609020204030204" pitchFamily="49" charset="0"/>
+              </a:rPr>
+              <a:t>					.</a:t>
+            </a:r>
+            <a:r>
+              <a:rPr lang="pt-BR" sz="1600" dirty="0">
+                <a:solidFill>
+                  <a:srgbClr val="7030A0"/>
+                </a:solidFill>
+                <a:latin typeface="Consolas" panose="020B0609020204030204" pitchFamily="49" charset="0"/>
+              </a:rPr>
+              <a:t>filter</a:t>
+            </a:r>
+            <a:r>
+              <a:rPr lang="pt-BR" sz="1600" dirty="0">
+                <a:latin typeface="Consolas" panose="020B0609020204030204" pitchFamily="49" charset="0"/>
+              </a:rPr>
+              <a:t>(</a:t>
+            </a:r>
+            <a:r>
+              <a:rPr lang="pt-BR" sz="1600" dirty="0">
+                <a:solidFill>
+                  <a:srgbClr val="FF0000"/>
+                </a:solidFill>
+                <a:latin typeface="Consolas" panose="020B0609020204030204" pitchFamily="49" charset="0"/>
+              </a:rPr>
+              <a:t>function </a:t>
+            </a:r>
+            <a:r>
+              <a:rPr lang="pt-BR" sz="1600" dirty="0">
+                <a:latin typeface="Consolas" panose="020B0609020204030204" pitchFamily="49" charset="0"/>
+              </a:rPr>
+              <a:t>(key) {</a:t>
+            </a:r>
+          </a:p>
+          <a:p>
+            <a:r>
+              <a:rPr lang="pt-BR" sz="1600" dirty="0">
+                <a:solidFill>
+                  <a:schemeClr val="tx1">
+                    <a:lumMod val="50000"/>
+                    <a:lumOff val="50000"/>
+                  </a:schemeClr>
+                </a:solidFill>
+                <a:latin typeface="Consolas" panose="020B0609020204030204" pitchFamily="49" charset="0"/>
+              </a:rPr>
+              <a:t>8</a:t>
+            </a:r>
+            <a:r>
+              <a:rPr lang="pt-BR" sz="1600" dirty="0">
+                <a:latin typeface="Consolas" panose="020B0609020204030204" pitchFamily="49" charset="0"/>
+              </a:rPr>
+              <a:t>						</a:t>
+            </a:r>
+            <a:r>
+              <a:rPr lang="pt-BR" sz="1600" dirty="0">
+                <a:solidFill>
+                  <a:srgbClr val="FF0000"/>
+                </a:solidFill>
+                <a:latin typeface="Consolas" panose="020B0609020204030204" pitchFamily="49" charset="0"/>
+              </a:rPr>
+              <a:t>Return </a:t>
+            </a:r>
+            <a:r>
+              <a:rPr lang="pt-BR" sz="1600" dirty="0">
+                <a:latin typeface="Consolas" panose="020B0609020204030204" pitchFamily="49" charset="0"/>
+              </a:rPr>
+              <a:t>key.</a:t>
+            </a:r>
+            <a:r>
+              <a:rPr lang="pt-BR" sz="1600" dirty="0">
+                <a:solidFill>
+                  <a:srgbClr val="7030A0"/>
+                </a:solidFill>
+                <a:latin typeface="Consolas" panose="020B0609020204030204" pitchFamily="49" charset="0"/>
+              </a:rPr>
+              <a:t>indexOf</a:t>
+            </a:r>
+            <a:r>
+              <a:rPr lang="pt-BR" sz="1600" dirty="0">
+                <a:latin typeface="Consolas" panose="020B0609020204030204" pitchFamily="49" charset="0"/>
+              </a:rPr>
+              <a:t>(</a:t>
+            </a:r>
+            <a:r>
+              <a:rPr lang="pt-BR" sz="1600" dirty="0">
+                <a:solidFill>
+                  <a:srgbClr val="0070C0"/>
+                </a:solidFill>
+                <a:latin typeface="Consolas" panose="020B0609020204030204" pitchFamily="49" charset="0"/>
+              </a:rPr>
+              <a:t>CACHE_NAME</a:t>
+            </a:r>
+            <a:r>
+              <a:rPr lang="pt-BR" sz="1600" dirty="0">
+                <a:latin typeface="Consolas" panose="020B0609020204030204" pitchFamily="49" charset="0"/>
+              </a:rPr>
+              <a:t>) !== </a:t>
+            </a:r>
+            <a:r>
+              <a:rPr lang="pt-BR" sz="1600" dirty="0">
+                <a:solidFill>
+                  <a:srgbClr val="0070C0"/>
+                </a:solidFill>
+                <a:latin typeface="Consolas" panose="020B0609020204030204" pitchFamily="49" charset="0"/>
+              </a:rPr>
+              <a:t>0</a:t>
+            </a:r>
+            <a:r>
+              <a:rPr lang="pt-BR" sz="1600" dirty="0">
+                <a:latin typeface="Consolas" panose="020B0609020204030204" pitchFamily="49" charset="0"/>
+              </a:rPr>
+              <a:t>;</a:t>
+            </a:r>
+          </a:p>
+          <a:p>
+            <a:r>
+              <a:rPr lang="pt-BR" sz="1600" dirty="0">
+                <a:solidFill>
+                  <a:schemeClr val="tx1">
+                    <a:lumMod val="50000"/>
+                    <a:lumOff val="50000"/>
+                  </a:schemeClr>
+                </a:solidFill>
+                <a:latin typeface="Consolas" panose="020B0609020204030204" pitchFamily="49" charset="0"/>
+              </a:rPr>
+              <a:t>9</a:t>
+            </a:r>
+            <a:r>
+              <a:rPr lang="pt-BR" sz="1600" dirty="0">
+                <a:latin typeface="Consolas" panose="020B0609020204030204" pitchFamily="49" charset="0"/>
+              </a:rPr>
+              <a:t>					})</a:t>
+            </a:r>
+          </a:p>
+          <a:p>
+            <a:r>
+              <a:rPr lang="pt-BR" sz="1600" dirty="0">
+                <a:solidFill>
+                  <a:schemeClr val="tx1">
+                    <a:lumMod val="50000"/>
+                    <a:lumOff val="50000"/>
+                  </a:schemeClr>
+                </a:solidFill>
+                <a:latin typeface="Consolas" panose="020B0609020204030204" pitchFamily="49" charset="0"/>
+              </a:rPr>
+              <a:t>10</a:t>
+            </a:r>
+            <a:r>
+              <a:rPr lang="pt-BR" sz="1600" dirty="0">
+                <a:latin typeface="Consolas" panose="020B0609020204030204" pitchFamily="49" charset="0"/>
+              </a:rPr>
+              <a:t>					.</a:t>
+            </a:r>
+            <a:r>
+              <a:rPr lang="pt-BR" sz="1600" dirty="0">
+                <a:solidFill>
+                  <a:srgbClr val="7030A0"/>
+                </a:solidFill>
+                <a:latin typeface="Consolas" panose="020B0609020204030204" pitchFamily="49" charset="0"/>
+              </a:rPr>
+              <a:t>map</a:t>
+            </a:r>
+            <a:r>
+              <a:rPr lang="pt-BR" sz="1600" dirty="0">
+                <a:latin typeface="Consolas" panose="020B0609020204030204" pitchFamily="49" charset="0"/>
+              </a:rPr>
+              <a:t>(</a:t>
+            </a:r>
+            <a:r>
+              <a:rPr lang="pt-BR" sz="1600" dirty="0">
+                <a:solidFill>
+                  <a:srgbClr val="FF0000"/>
+                </a:solidFill>
+                <a:latin typeface="Consolas" panose="020B0609020204030204" pitchFamily="49" charset="0"/>
+              </a:rPr>
+              <a:t>function</a:t>
+            </a:r>
+            <a:r>
+              <a:rPr lang="pt-BR" sz="1600" dirty="0">
+                <a:latin typeface="Consolas" panose="020B0609020204030204" pitchFamily="49" charset="0"/>
+              </a:rPr>
+              <a:t> (key) {</a:t>
+            </a:r>
+          </a:p>
+          <a:p>
+            <a:r>
+              <a:rPr lang="pt-BR" sz="1600" dirty="0">
+                <a:solidFill>
+                  <a:schemeClr val="tx1">
+                    <a:lumMod val="50000"/>
+                    <a:lumOff val="50000"/>
+                  </a:schemeClr>
+                </a:solidFill>
+                <a:latin typeface="Consolas" panose="020B0609020204030204" pitchFamily="49" charset="0"/>
+              </a:rPr>
+              <a:t>11</a:t>
+            </a:r>
+            <a:r>
+              <a:rPr lang="pt-BR" sz="1600" dirty="0">
+                <a:latin typeface="Consolas" panose="020B0609020204030204" pitchFamily="49" charset="0"/>
+              </a:rPr>
+              <a:t>						</a:t>
+            </a:r>
+            <a:r>
+              <a:rPr lang="pt-BR" sz="1600" dirty="0">
+                <a:solidFill>
+                  <a:srgbClr val="FF0000"/>
+                </a:solidFill>
+                <a:latin typeface="Consolas" panose="020B0609020204030204" pitchFamily="49" charset="0"/>
+              </a:rPr>
+              <a:t>return</a:t>
+            </a:r>
+            <a:r>
+              <a:rPr lang="pt-BR" sz="1600" dirty="0">
+                <a:latin typeface="Consolas" panose="020B0609020204030204" pitchFamily="49" charset="0"/>
+              </a:rPr>
+              <a:t> caches.</a:t>
+            </a:r>
+            <a:r>
+              <a:rPr lang="pt-BR" sz="1600" dirty="0">
+                <a:solidFill>
+                  <a:srgbClr val="7030A0"/>
+                </a:solidFill>
+                <a:latin typeface="Consolas" panose="020B0609020204030204" pitchFamily="49" charset="0"/>
+              </a:rPr>
+              <a:t>delete</a:t>
+            </a:r>
+            <a:r>
+              <a:rPr lang="pt-BR" sz="1600" dirty="0">
+                <a:latin typeface="Consolas" panose="020B0609020204030204" pitchFamily="49" charset="0"/>
+              </a:rPr>
+              <a:t>(key);</a:t>
+            </a:r>
+          </a:p>
+          <a:p>
+            <a:r>
+              <a:rPr lang="pt-BR" sz="1600" dirty="0">
+                <a:solidFill>
+                  <a:schemeClr val="tx1">
+                    <a:lumMod val="50000"/>
+                    <a:lumOff val="50000"/>
+                  </a:schemeClr>
+                </a:solidFill>
+                <a:latin typeface="Consolas" panose="020B0609020204030204" pitchFamily="49" charset="0"/>
+              </a:rPr>
+              <a:t>12</a:t>
+            </a:r>
+            <a:r>
+              <a:rPr lang="pt-BR" sz="1600" dirty="0">
+                <a:latin typeface="Consolas" panose="020B0609020204030204" pitchFamily="49" charset="0"/>
+              </a:rPr>
+              <a:t>					}) </a:t>
+            </a:r>
+          </a:p>
+          <a:p>
+            <a:r>
+              <a:rPr lang="pt-BR" sz="1600" dirty="0">
+                <a:solidFill>
+                  <a:schemeClr val="tx1">
+                    <a:lumMod val="50000"/>
+                    <a:lumOff val="50000"/>
+                  </a:schemeClr>
+                </a:solidFill>
+                <a:latin typeface="Consolas" panose="020B0609020204030204" pitchFamily="49" charset="0"/>
+              </a:rPr>
+              <a:t>13</a:t>
+            </a:r>
+            <a:r>
+              <a:rPr lang="pt-BR" sz="1600" dirty="0">
+                <a:latin typeface="Consolas" panose="020B0609020204030204" pitchFamily="49" charset="0"/>
+              </a:rPr>
+              <a:t>				);</a:t>
+            </a:r>
+          </a:p>
+          <a:p>
+            <a:r>
+              <a:rPr lang="pt-BR" sz="1600" dirty="0">
+                <a:solidFill>
+                  <a:schemeClr val="tx1">
+                    <a:lumMod val="50000"/>
+                    <a:lumOff val="50000"/>
+                  </a:schemeClr>
+                </a:solidFill>
+                <a:latin typeface="Consolas" panose="020B0609020204030204" pitchFamily="49" charset="0"/>
+              </a:rPr>
+              <a:t>14</a:t>
+            </a:r>
+            <a:r>
+              <a:rPr lang="pt-BR" sz="1600" dirty="0">
+                <a:latin typeface="Consolas" panose="020B0609020204030204" pitchFamily="49" charset="0"/>
+              </a:rPr>
+              <a:t>	  		})</a:t>
+            </a:r>
+          </a:p>
+          <a:p>
+            <a:r>
+              <a:rPr lang="pt-BR" sz="1600" dirty="0">
+                <a:solidFill>
+                  <a:schemeClr val="tx1">
+                    <a:lumMod val="50000"/>
+                    <a:lumOff val="50000"/>
+                  </a:schemeClr>
+                </a:solidFill>
+                <a:latin typeface="Consolas" panose="020B0609020204030204" pitchFamily="49" charset="0"/>
+              </a:rPr>
+              <a:t>15   	</a:t>
+            </a:r>
+            <a:r>
+              <a:rPr lang="pt-BR" sz="1600" dirty="0">
+                <a:solidFill>
+                  <a:schemeClr val="tx1">
+                    <a:lumMod val="75000"/>
+                    <a:lumOff val="25000"/>
+                  </a:schemeClr>
+                </a:solidFill>
+                <a:latin typeface="Consolas" panose="020B0609020204030204" pitchFamily="49" charset="0"/>
+              </a:rPr>
+              <a:t>);</a:t>
+            </a:r>
+          </a:p>
+          <a:p>
+            <a:r>
+              <a:rPr lang="pt-BR" sz="1600" dirty="0">
+                <a:solidFill>
+                  <a:schemeClr val="tx1">
+                    <a:lumMod val="50000"/>
+                    <a:lumOff val="50000"/>
+                  </a:schemeClr>
+                </a:solidFill>
+                <a:latin typeface="Consolas" panose="020B0609020204030204" pitchFamily="49" charset="0"/>
+              </a:rPr>
+              <a:t>16  </a:t>
+            </a:r>
+            <a:r>
+              <a:rPr lang="pt-BR" sz="1600" dirty="0">
+                <a:latin typeface="Consolas" panose="020B0609020204030204" pitchFamily="49" charset="0"/>
+              </a:rPr>
+              <a:t>});</a:t>
+            </a:r>
+          </a:p>
+          <a:p>
+            <a:endParaRPr lang="pt-BR" sz="1600" dirty="0">
+              <a:solidFill>
+                <a:schemeClr val="tx1">
+                  <a:lumMod val="50000"/>
+                  <a:lumOff val="50000"/>
+                </a:schemeClr>
+              </a:solidFill>
+              <a:latin typeface="Consolas" panose="020B0609020204030204" pitchFamily="49" charset="0"/>
+            </a:endParaRPr>
+          </a:p>
+          <a:p>
+            <a:pPr marL="342900" indent="-342900">
+              <a:buAutoNum type="arabicPlain" startAt="15"/>
+            </a:pPr>
+            <a:endParaRPr lang="pt-BR" sz="1600" dirty="0">
+              <a:latin typeface="Consolas" panose="020B0609020204030204" pitchFamily="49" charset="0"/>
+            </a:endParaRPr>
+          </a:p>
+        </p:txBody>
+      </p:sp>
+    </p:spTree>
+    <p:extLst>
+      <p:ext uri="{BB962C8B-B14F-4D97-AF65-F5344CB8AC3E}">
+        <p14:creationId xmlns:p14="http://schemas.microsoft.com/office/powerpoint/2010/main" val="2263357483"/>
+      </p:ext>
+    </p:extLst>
+  </p:cSld>
+  <p:clrMapOvr>
+    <a:masterClrMapping/>
+  </p:clrMapOvr>
+</p:sld>
+</file>
+
+<file path=ppt/slides/slide18.xml><?xml version="1.0" encoding="utf-8"?>
+<p:sld xmlns:a="http://schemas.openxmlformats.org/drawingml/2006/main" xmlns:r="http://schemas.openxmlformats.org/officeDocument/2006/relationships" xmlns:p="http://schemas.openxmlformats.org/presentationml/2006/main">
+  <p:cSld>
+    <p:spTree>
+      <p:nvGrpSpPr>
+        <p:cNvPr id="1" name=""/>
+        <p:cNvGrpSpPr/>
+        <p:nvPr/>
+      </p:nvGrpSpPr>
+      <p:grpSpPr>
+        <a:xfrm>
+          <a:off x="0" y="0"/>
+          <a:ext cx="0" cy="0"/>
+          <a:chOff x="0" y="0"/>
+          <a:chExt cx="0" cy="0"/>
+        </a:xfrm>
+      </p:grpSpPr>
+      <p:sp>
+        <p:nvSpPr>
+          <p:cNvPr id="2" name="Título 1">
+            <a:extLst>
+              <a:ext uri="{FF2B5EF4-FFF2-40B4-BE49-F238E27FC236}">
+                <a16:creationId xmlns:a16="http://schemas.microsoft.com/office/drawing/2014/main" id="{F7649200-3852-7866-2E3C-AB07108150A8}"/>
+              </a:ext>
+            </a:extLst>
+          </p:cNvPr>
+          <p:cNvSpPr>
+            <a:spLocks noGrp="1"/>
+          </p:cNvSpPr>
+          <p:nvPr>
+            <p:ph type="title"/>
+          </p:nvPr>
+        </p:nvSpPr>
+        <p:spPr/>
+        <p:txBody>
+          <a:bodyPr/>
+          <a:lstStyle/>
+          <a:p>
+            <a:r>
+              <a:rPr lang="pt-BR" dirty="0"/>
+              <a:t>Transformando um</a:t>
+            </a:r>
+            <a:r>
+              <a:rPr lang="pt-BR" i="1" dirty="0"/>
+              <a:t> site</a:t>
+            </a:r>
+            <a:r>
+              <a:rPr lang="pt-BR" dirty="0"/>
+              <a:t> em um </a:t>
+            </a:r>
+            <a:r>
+              <a:rPr lang="pt-BR" dirty="0" err="1"/>
+              <a:t>WebApp</a:t>
+            </a:r>
+            <a:br>
+              <a:rPr lang="pt-BR" dirty="0"/>
+            </a:br>
+            <a:r>
+              <a:rPr lang="pt-BR" sz="2400" dirty="0"/>
+              <a:t>INTERCEPTAR REQUISIÇÕES</a:t>
+            </a:r>
+            <a:endParaRPr lang="pt-BR" sz="2400" i="1" dirty="0"/>
+          </a:p>
+        </p:txBody>
+      </p:sp>
+      <p:sp>
+        <p:nvSpPr>
+          <p:cNvPr id="3" name="Espaço Reservado para Conteúdo 2">
+            <a:extLst>
+              <a:ext uri="{FF2B5EF4-FFF2-40B4-BE49-F238E27FC236}">
+                <a16:creationId xmlns:a16="http://schemas.microsoft.com/office/drawing/2014/main" id="{BC621189-6CC5-D3DF-91C1-80746A497F29}"/>
+              </a:ext>
+            </a:extLst>
+          </p:cNvPr>
+          <p:cNvSpPr>
+            <a:spLocks noGrp="1"/>
+          </p:cNvSpPr>
+          <p:nvPr>
+            <p:ph idx="1"/>
+          </p:nvPr>
+        </p:nvSpPr>
+        <p:spPr>
+          <a:xfrm>
+            <a:off x="1097280" y="1896397"/>
+            <a:ext cx="10058400" cy="4023360"/>
+          </a:xfrm>
+        </p:spPr>
+        <p:txBody>
+          <a:bodyPr>
+            <a:normAutofit/>
+          </a:bodyPr>
+          <a:lstStyle/>
+          <a:p>
+            <a:pPr marL="0" indent="0">
+              <a:buNone/>
+            </a:pPr>
+            <a:r>
+              <a:rPr lang="pt-BR" sz="2400" dirty="0"/>
+              <a:t>É necessário buscar informações no cache antes de fazer um </a:t>
+            </a:r>
+            <a:r>
+              <a:rPr lang="pt-BR" sz="2400" i="1" dirty="0" err="1"/>
+              <a:t>request</a:t>
+            </a:r>
+            <a:r>
+              <a:rPr lang="pt-BR" sz="2400" dirty="0"/>
+              <a:t>. </a:t>
+            </a:r>
+          </a:p>
+          <a:p>
+            <a:pPr marL="0" indent="0">
+              <a:buNone/>
+            </a:pPr>
+            <a:r>
+              <a:rPr lang="pt-BR" sz="2400" dirty="0"/>
+              <a:t>O </a:t>
+            </a:r>
+            <a:r>
+              <a:rPr lang="pt-BR" sz="2400" i="1" dirty="0" err="1"/>
+              <a:t>request</a:t>
+            </a:r>
+            <a:r>
+              <a:rPr lang="pt-BR" sz="2400" dirty="0"/>
+              <a:t> só é feito quando não há informações em cache.</a:t>
+            </a:r>
+          </a:p>
+        </p:txBody>
+      </p:sp>
+      <p:sp>
+        <p:nvSpPr>
+          <p:cNvPr id="5" name="CaixaDeTexto 4">
+            <a:extLst>
+              <a:ext uri="{FF2B5EF4-FFF2-40B4-BE49-F238E27FC236}">
+                <a16:creationId xmlns:a16="http://schemas.microsoft.com/office/drawing/2014/main" id="{078F35EF-23B6-D274-A187-21B7A0DB837B}"/>
+              </a:ext>
+            </a:extLst>
+          </p:cNvPr>
+          <p:cNvSpPr txBox="1"/>
+          <p:nvPr/>
+        </p:nvSpPr>
+        <p:spPr>
+          <a:xfrm>
+            <a:off x="2015706" y="3908077"/>
+            <a:ext cx="8160588" cy="1815882"/>
+          </a:xfrm>
+          <a:prstGeom prst="rect">
+            <a:avLst/>
+          </a:prstGeom>
+        </p:spPr>
+        <p:style>
+          <a:lnRef idx="2">
+            <a:schemeClr val="dk1"/>
+          </a:lnRef>
+          <a:fillRef idx="1">
+            <a:schemeClr val="lt1"/>
+          </a:fillRef>
+          <a:effectRef idx="0">
+            <a:schemeClr val="dk1"/>
+          </a:effectRef>
+          <a:fontRef idx="minor">
+            <a:schemeClr val="dk1"/>
+          </a:fontRef>
+        </p:style>
+        <p:txBody>
+          <a:bodyPr wrap="square" rtlCol="0">
+            <a:spAutoFit/>
+          </a:bodyPr>
+          <a:lstStyle/>
+          <a:p>
+            <a:r>
+              <a:rPr lang="pt-BR" sz="1600" dirty="0">
+                <a:solidFill>
+                  <a:schemeClr val="tx1">
+                    <a:lumMod val="50000"/>
+                    <a:lumOff val="50000"/>
+                  </a:schemeClr>
+                </a:solidFill>
+                <a:latin typeface="Consolas" panose="020B0609020204030204" pitchFamily="49" charset="0"/>
+              </a:rPr>
+              <a:t>1	</a:t>
+            </a:r>
+            <a:r>
+              <a:rPr lang="pt-BR" sz="1600" dirty="0">
+                <a:latin typeface="Consolas" panose="020B0609020204030204" pitchFamily="49" charset="0"/>
+              </a:rPr>
+              <a:t>self.</a:t>
+            </a:r>
+            <a:r>
+              <a:rPr lang="pt-BR" sz="1600" dirty="0">
+                <a:solidFill>
+                  <a:srgbClr val="7030A0"/>
+                </a:solidFill>
+                <a:latin typeface="Consolas" panose="020B0609020204030204" pitchFamily="49" charset="0"/>
+              </a:rPr>
+              <a:t>addEventListener</a:t>
+            </a:r>
+            <a:r>
+              <a:rPr lang="pt-BR" sz="1600" dirty="0">
+                <a:latin typeface="Consolas" panose="020B0609020204030204" pitchFamily="49" charset="0"/>
+              </a:rPr>
+              <a:t>(‘fetch’, </a:t>
+            </a:r>
+            <a:r>
+              <a:rPr lang="pt-BR" sz="1600" dirty="0">
+                <a:solidFill>
+                  <a:srgbClr val="FF0000"/>
+                </a:solidFill>
+                <a:latin typeface="Consolas" panose="020B0609020204030204" pitchFamily="49" charset="0"/>
+              </a:rPr>
+              <a:t>function </a:t>
+            </a:r>
+            <a:r>
+              <a:rPr lang="pt-BR" sz="1600" dirty="0">
+                <a:latin typeface="Consolas" panose="020B0609020204030204" pitchFamily="49" charset="0"/>
+              </a:rPr>
+              <a:t>(event) {</a:t>
+            </a:r>
+          </a:p>
+          <a:p>
+            <a:r>
+              <a:rPr lang="pt-BR" sz="1600" dirty="0">
+                <a:solidFill>
+                  <a:schemeClr val="tx1">
+                    <a:lumMod val="50000"/>
+                    <a:lumOff val="50000"/>
+                  </a:schemeClr>
+                </a:solidFill>
+                <a:latin typeface="Consolas" panose="020B0609020204030204" pitchFamily="49" charset="0"/>
+              </a:rPr>
+              <a:t>2		</a:t>
+            </a:r>
+            <a:r>
+              <a:rPr lang="pt-BR" sz="1600" dirty="0">
+                <a:latin typeface="Consolas" panose="020B0609020204030204" pitchFamily="49" charset="0"/>
+              </a:rPr>
+              <a:t>event.</a:t>
+            </a:r>
+            <a:r>
+              <a:rPr lang="pt-BR" sz="1600" dirty="0">
+                <a:solidFill>
+                  <a:srgbClr val="7030A0"/>
+                </a:solidFill>
+                <a:latin typeface="Consolas" panose="020B0609020204030204" pitchFamily="49" charset="0"/>
+              </a:rPr>
+              <a:t>respondWith</a:t>
+            </a:r>
+            <a:r>
+              <a:rPr lang="pt-BR" sz="1600" dirty="0">
+                <a:latin typeface="Consolas" panose="020B0609020204030204" pitchFamily="49" charset="0"/>
+              </a:rPr>
+              <a:t>(</a:t>
+            </a:r>
+          </a:p>
+          <a:p>
+            <a:r>
+              <a:rPr lang="pt-BR" sz="1600" dirty="0">
+                <a:solidFill>
+                  <a:schemeClr val="tx1">
+                    <a:lumMod val="50000"/>
+                    <a:lumOff val="50000"/>
+                  </a:schemeClr>
+                </a:solidFill>
+                <a:latin typeface="Consolas" panose="020B0609020204030204" pitchFamily="49" charset="0"/>
+              </a:rPr>
+              <a:t>3			</a:t>
+            </a:r>
+            <a:r>
+              <a:rPr lang="pt-BR" sz="1600" dirty="0">
+                <a:latin typeface="Consolas" panose="020B0609020204030204" pitchFamily="49" charset="0"/>
+              </a:rPr>
+              <a:t> caches.</a:t>
+            </a:r>
+            <a:r>
+              <a:rPr lang="pt-BR" sz="1600" dirty="0">
+                <a:solidFill>
+                  <a:srgbClr val="7030A0"/>
+                </a:solidFill>
+                <a:latin typeface="Consolas" panose="020B0609020204030204" pitchFamily="49" charset="0"/>
+              </a:rPr>
+              <a:t>match</a:t>
+            </a:r>
+            <a:r>
+              <a:rPr lang="pt-BR" sz="1600" dirty="0">
+                <a:latin typeface="Consolas" panose="020B0609020204030204" pitchFamily="49" charset="0"/>
+              </a:rPr>
+              <a:t>(event.</a:t>
+            </a:r>
+            <a:r>
+              <a:rPr lang="pt-BR" sz="1600" dirty="0">
+                <a:solidFill>
+                  <a:srgbClr val="0070C0"/>
+                </a:solidFill>
+                <a:latin typeface="Consolas" panose="020B0609020204030204" pitchFamily="49" charset="0"/>
+              </a:rPr>
+              <a:t>request</a:t>
+            </a:r>
+            <a:r>
+              <a:rPr lang="pt-BR" sz="1600" dirty="0">
+                <a:latin typeface="Consolas" panose="020B0609020204030204" pitchFamily="49" charset="0"/>
+              </a:rPr>
+              <a:t>).</a:t>
+            </a:r>
+            <a:r>
+              <a:rPr lang="pt-BR" sz="1600" dirty="0">
+                <a:solidFill>
+                  <a:srgbClr val="7030A0"/>
+                </a:solidFill>
+                <a:latin typeface="Consolas" panose="020B0609020204030204" pitchFamily="49" charset="0"/>
+              </a:rPr>
+              <a:t>then</a:t>
+            </a:r>
+            <a:r>
+              <a:rPr lang="pt-BR" sz="1600" dirty="0">
+                <a:latin typeface="Consolas" panose="020B0609020204030204" pitchFamily="49" charset="0"/>
+              </a:rPr>
+              <a:t>(</a:t>
+            </a:r>
+            <a:r>
+              <a:rPr lang="pt-BR" sz="1600" dirty="0">
+                <a:solidFill>
+                  <a:srgbClr val="FF0000"/>
+                </a:solidFill>
+                <a:latin typeface="Consolas" panose="020B0609020204030204" pitchFamily="49" charset="0"/>
+              </a:rPr>
+              <a:t>function</a:t>
+            </a:r>
+            <a:r>
+              <a:rPr lang="pt-BR" sz="1600" dirty="0">
+                <a:latin typeface="Consolas" panose="020B0609020204030204" pitchFamily="49" charset="0"/>
+              </a:rPr>
+              <a:t> (cacheResponse){</a:t>
+            </a:r>
+          </a:p>
+          <a:p>
+            <a:r>
+              <a:rPr lang="pt-BR" sz="1600" dirty="0">
+                <a:solidFill>
+                  <a:schemeClr val="tx1">
+                    <a:lumMod val="50000"/>
+                    <a:lumOff val="50000"/>
+                  </a:schemeClr>
+                </a:solidFill>
+                <a:latin typeface="Consolas" panose="020B0609020204030204" pitchFamily="49" charset="0"/>
+              </a:rPr>
+              <a:t>4</a:t>
+            </a:r>
+            <a:r>
+              <a:rPr lang="pt-BR" sz="1600" dirty="0">
+                <a:latin typeface="Consolas" panose="020B0609020204030204" pitchFamily="49" charset="0"/>
+              </a:rPr>
+              <a:t>				</a:t>
+            </a:r>
+            <a:r>
+              <a:rPr lang="pt-BR" sz="1600" dirty="0">
+                <a:solidFill>
+                  <a:srgbClr val="FF0000"/>
+                </a:solidFill>
+                <a:latin typeface="Consolas" panose="020B0609020204030204" pitchFamily="49" charset="0"/>
+              </a:rPr>
+              <a:t>return</a:t>
+            </a:r>
+            <a:r>
+              <a:rPr lang="pt-BR" sz="1600" dirty="0">
+                <a:latin typeface="Consolas" panose="020B0609020204030204" pitchFamily="49" charset="0"/>
+              </a:rPr>
+              <a:t> cacheResponse</a:t>
+            </a:r>
+            <a:r>
+              <a:rPr lang="pt-BR" sz="1600" dirty="0">
+                <a:solidFill>
+                  <a:srgbClr val="FF0000"/>
+                </a:solidFill>
+                <a:latin typeface="Consolas" panose="020B0609020204030204" pitchFamily="49" charset="0"/>
+              </a:rPr>
+              <a:t> </a:t>
+            </a:r>
+            <a:r>
+              <a:rPr lang="pt-BR" sz="1600" dirty="0">
+                <a:solidFill>
+                  <a:srgbClr val="0070C0"/>
+                </a:solidFill>
+                <a:latin typeface="Consolas" panose="020B0609020204030204" pitchFamily="49" charset="0"/>
+              </a:rPr>
+              <a:t>||</a:t>
+            </a:r>
+            <a:r>
+              <a:rPr lang="pt-BR" sz="1600" dirty="0">
+                <a:solidFill>
+                  <a:srgbClr val="FF0000"/>
+                </a:solidFill>
+                <a:latin typeface="Consolas" panose="020B0609020204030204" pitchFamily="49" charset="0"/>
+              </a:rPr>
+              <a:t> fetch(</a:t>
+            </a:r>
+            <a:r>
+              <a:rPr lang="pt-BR" sz="1600" dirty="0">
+                <a:latin typeface="Consolas" panose="020B0609020204030204" pitchFamily="49" charset="0"/>
+              </a:rPr>
+              <a:t>event</a:t>
+            </a:r>
+            <a:r>
+              <a:rPr lang="pt-BR" sz="1600" dirty="0">
+                <a:solidFill>
+                  <a:srgbClr val="FF0000"/>
+                </a:solidFill>
+                <a:latin typeface="Consolas" panose="020B0609020204030204" pitchFamily="49" charset="0"/>
+              </a:rPr>
+              <a:t>.</a:t>
+            </a:r>
+            <a:r>
+              <a:rPr lang="pt-BR" sz="1600" dirty="0">
+                <a:solidFill>
+                  <a:srgbClr val="0070C0"/>
+                </a:solidFill>
+                <a:latin typeface="Consolas" panose="020B0609020204030204" pitchFamily="49" charset="0"/>
+              </a:rPr>
+              <a:t>request</a:t>
+            </a:r>
+            <a:r>
+              <a:rPr lang="pt-BR" sz="1600" dirty="0">
+                <a:solidFill>
+                  <a:srgbClr val="FF0000"/>
+                </a:solidFill>
+                <a:latin typeface="Consolas" panose="020B0609020204030204" pitchFamily="49" charset="0"/>
+              </a:rPr>
+              <a:t>);</a:t>
+            </a:r>
+            <a:endParaRPr lang="pt-BR" sz="1600" dirty="0">
+              <a:latin typeface="Consolas" panose="020B0609020204030204" pitchFamily="49" charset="0"/>
+            </a:endParaRPr>
+          </a:p>
+          <a:p>
+            <a:r>
+              <a:rPr lang="pt-BR" sz="1600" dirty="0">
+                <a:solidFill>
+                  <a:schemeClr val="tx1">
+                    <a:lumMod val="50000"/>
+                    <a:lumOff val="50000"/>
+                  </a:schemeClr>
+                </a:solidFill>
+                <a:latin typeface="Consolas" panose="020B0609020204030204" pitchFamily="49" charset="0"/>
+              </a:rPr>
+              <a:t>5</a:t>
+            </a:r>
+            <a:r>
+              <a:rPr lang="pt-BR" sz="1600" dirty="0">
+                <a:latin typeface="Consolas" panose="020B0609020204030204" pitchFamily="49" charset="0"/>
+              </a:rPr>
+              <a:t>			 })</a:t>
+            </a:r>
+          </a:p>
+          <a:p>
+            <a:r>
+              <a:rPr lang="pt-BR" sz="1600" dirty="0">
+                <a:solidFill>
+                  <a:schemeClr val="tx1">
+                    <a:lumMod val="50000"/>
+                    <a:lumOff val="50000"/>
+                  </a:schemeClr>
+                </a:solidFill>
+                <a:latin typeface="Consolas" panose="020B0609020204030204" pitchFamily="49" charset="0"/>
+              </a:rPr>
+              <a:t>6</a:t>
+            </a:r>
+            <a:r>
+              <a:rPr lang="pt-BR" sz="1600" dirty="0">
+                <a:latin typeface="Consolas" panose="020B0609020204030204" pitchFamily="49" charset="0"/>
+              </a:rPr>
+              <a:t>		);</a:t>
+            </a:r>
+          </a:p>
+          <a:p>
+            <a:r>
+              <a:rPr lang="pt-BR" sz="1600" dirty="0">
+                <a:solidFill>
+                  <a:schemeClr val="tx1">
+                    <a:lumMod val="50000"/>
+                    <a:lumOff val="50000"/>
+                  </a:schemeClr>
+                </a:solidFill>
+                <a:latin typeface="Consolas" panose="020B0609020204030204" pitchFamily="49" charset="0"/>
+              </a:rPr>
+              <a:t>7</a:t>
+            </a:r>
+            <a:r>
+              <a:rPr lang="pt-BR" sz="1600" dirty="0">
+                <a:latin typeface="Consolas" panose="020B0609020204030204" pitchFamily="49" charset="0"/>
+              </a:rPr>
+              <a:t>	});</a:t>
+            </a:r>
+          </a:p>
+        </p:txBody>
+      </p:sp>
+    </p:spTree>
+    <p:extLst>
+      <p:ext uri="{BB962C8B-B14F-4D97-AF65-F5344CB8AC3E}">
+        <p14:creationId xmlns:p14="http://schemas.microsoft.com/office/powerpoint/2010/main" val="868950351"/>
+      </p:ext>
+    </p:extLst>
+  </p:cSld>
+  <p:clrMapOvr>
+    <a:masterClrMapping/>
+  </p:clrMapOvr>
+</p:sld>
+</file>
+
+<file path=ppt/slides/slide19.xml><?xml version="1.0" encoding="utf-8"?>
+<p:sld xmlns:a="http://schemas.openxmlformats.org/drawingml/2006/main" xmlns:r="http://schemas.openxmlformats.org/officeDocument/2006/relationships" xmlns:p="http://schemas.openxmlformats.org/presentationml/2006/main">
+  <p:cSld>
+    <p:spTree>
+      <p:nvGrpSpPr>
+        <p:cNvPr id="1" name=""/>
+        <p:cNvGrpSpPr/>
+        <p:nvPr/>
+      </p:nvGrpSpPr>
+      <p:grpSpPr>
+        <a:xfrm>
+          <a:off x="0" y="0"/>
+          <a:ext cx="0" cy="0"/>
+          <a:chOff x="0" y="0"/>
+          <a:chExt cx="0" cy="0"/>
+        </a:xfrm>
+      </p:grpSpPr>
+      <p:sp>
+        <p:nvSpPr>
+          <p:cNvPr id="2" name="Título 1">
+            <a:extLst>
+              <a:ext uri="{FF2B5EF4-FFF2-40B4-BE49-F238E27FC236}">
+                <a16:creationId xmlns:a16="http://schemas.microsoft.com/office/drawing/2014/main" id="{F7649200-3852-7866-2E3C-AB07108150A8}"/>
+              </a:ext>
+            </a:extLst>
+          </p:cNvPr>
+          <p:cNvSpPr>
+            <a:spLocks noGrp="1"/>
+          </p:cNvSpPr>
+          <p:nvPr>
+            <p:ph type="title"/>
+          </p:nvPr>
+        </p:nvSpPr>
+        <p:spPr/>
+        <p:txBody>
+          <a:bodyPr/>
+          <a:lstStyle/>
+          <a:p>
+            <a:r>
+              <a:rPr lang="pt-BR" dirty="0"/>
+              <a:t>Transformando um</a:t>
+            </a:r>
+            <a:r>
+              <a:rPr lang="pt-BR" i="1" dirty="0"/>
+              <a:t> site</a:t>
+            </a:r>
+            <a:r>
+              <a:rPr lang="pt-BR" dirty="0"/>
+              <a:t> em um </a:t>
+            </a:r>
+            <a:r>
+              <a:rPr lang="pt-BR" dirty="0" err="1"/>
+              <a:t>WebApp</a:t>
+            </a:r>
+            <a:br>
+              <a:rPr lang="pt-BR" dirty="0"/>
+            </a:br>
+            <a:r>
+              <a:rPr lang="pt-BR" sz="2400" dirty="0"/>
+              <a:t>ADICIONAR NO ARQUIVO </a:t>
+            </a:r>
+            <a:r>
+              <a:rPr lang="pt-BR" sz="2400" i="1" dirty="0"/>
+              <a:t>INDEX.HTML</a:t>
+            </a:r>
+          </a:p>
+        </p:txBody>
+      </p:sp>
+      <p:sp>
+        <p:nvSpPr>
+          <p:cNvPr id="3" name="Espaço Reservado para Conteúdo 2">
+            <a:extLst>
+              <a:ext uri="{FF2B5EF4-FFF2-40B4-BE49-F238E27FC236}">
+                <a16:creationId xmlns:a16="http://schemas.microsoft.com/office/drawing/2014/main" id="{BC621189-6CC5-D3DF-91C1-80746A497F29}"/>
+              </a:ext>
+            </a:extLst>
+          </p:cNvPr>
+          <p:cNvSpPr>
+            <a:spLocks noGrp="1"/>
+          </p:cNvSpPr>
+          <p:nvPr>
+            <p:ph idx="1"/>
+          </p:nvPr>
+        </p:nvSpPr>
+        <p:spPr>
+          <a:xfrm>
+            <a:off x="1097280" y="1896397"/>
+            <a:ext cx="10058400" cy="4023360"/>
+          </a:xfrm>
+        </p:spPr>
+        <p:txBody>
+          <a:bodyPr>
+            <a:normAutofit/>
+          </a:bodyPr>
+          <a:lstStyle/>
+          <a:p>
+            <a:pPr marL="0" indent="0">
+              <a:buNone/>
+            </a:pPr>
+            <a:r>
+              <a:rPr lang="pt-BR" sz="2400" dirty="0"/>
+              <a:t>Por fim, é necessário associar o </a:t>
+            </a:r>
+            <a:r>
+              <a:rPr lang="pt-BR" sz="2400" i="1" dirty="0"/>
+              <a:t>service worker</a:t>
+            </a:r>
+            <a:r>
+              <a:rPr lang="pt-BR" sz="2400" dirty="0"/>
+              <a:t> ao </a:t>
+            </a:r>
+            <a:r>
+              <a:rPr lang="pt-BR" sz="2400" i="1" dirty="0"/>
+              <a:t>site</a:t>
+            </a:r>
+            <a:r>
+              <a:rPr lang="pt-BR" sz="2400" dirty="0"/>
+              <a:t> através da inserção </a:t>
+            </a:r>
+            <a:r>
+              <a:rPr lang="pt-BR" sz="2400" i="1" dirty="0"/>
+              <a:t>service worker</a:t>
+            </a:r>
+            <a:r>
+              <a:rPr lang="pt-BR" sz="2400" dirty="0"/>
+              <a:t> no </a:t>
+            </a:r>
+            <a:r>
+              <a:rPr lang="pt-BR" sz="2400" i="1" dirty="0"/>
+              <a:t>index.html</a:t>
+            </a:r>
+            <a:r>
+              <a:rPr lang="pt-BR" sz="2400" dirty="0"/>
+              <a:t>.</a:t>
+            </a:r>
+          </a:p>
+        </p:txBody>
+      </p:sp>
+      <p:sp>
+        <p:nvSpPr>
+          <p:cNvPr id="5" name="CaixaDeTexto 4">
+            <a:extLst>
+              <a:ext uri="{FF2B5EF4-FFF2-40B4-BE49-F238E27FC236}">
+                <a16:creationId xmlns:a16="http://schemas.microsoft.com/office/drawing/2014/main" id="{078F35EF-23B6-D274-A187-21B7A0DB837B}"/>
+              </a:ext>
+            </a:extLst>
+          </p:cNvPr>
+          <p:cNvSpPr txBox="1"/>
+          <p:nvPr/>
+        </p:nvSpPr>
+        <p:spPr>
+          <a:xfrm>
+            <a:off x="2015706" y="2924664"/>
+            <a:ext cx="8160588" cy="2800767"/>
+          </a:xfrm>
+          <a:prstGeom prst="rect">
+            <a:avLst/>
+          </a:prstGeom>
+        </p:spPr>
+        <p:style>
+          <a:lnRef idx="2">
+            <a:schemeClr val="dk1"/>
+          </a:lnRef>
+          <a:fillRef idx="1">
+            <a:schemeClr val="lt1"/>
+          </a:fillRef>
+          <a:effectRef idx="0">
+            <a:schemeClr val="dk1"/>
+          </a:effectRef>
+          <a:fontRef idx="minor">
+            <a:schemeClr val="dk1"/>
+          </a:fontRef>
+        </p:style>
+        <p:txBody>
+          <a:bodyPr wrap="square" rtlCol="0">
+            <a:spAutoFit/>
+          </a:bodyPr>
+          <a:lstStyle/>
+          <a:p>
+            <a:r>
+              <a:rPr lang="pt-BR" sz="1600" dirty="0">
+                <a:solidFill>
+                  <a:schemeClr val="tx1">
+                    <a:lumMod val="50000"/>
+                    <a:lumOff val="50000"/>
+                  </a:schemeClr>
+                </a:solidFill>
+                <a:latin typeface="Consolas" panose="020B0609020204030204" pitchFamily="49" charset="0"/>
+              </a:rPr>
+              <a:t>1	</a:t>
+            </a:r>
+            <a:r>
+              <a:rPr lang="pt-BR" sz="1600" dirty="0">
+                <a:latin typeface="Consolas" panose="020B0609020204030204" pitchFamily="49" charset="0"/>
+              </a:rPr>
+              <a:t>&lt;</a:t>
+            </a:r>
+            <a:r>
+              <a:rPr lang="pt-BR" sz="1600" dirty="0">
+                <a:solidFill>
+                  <a:srgbClr val="00B050"/>
+                </a:solidFill>
+                <a:latin typeface="Consolas" panose="020B0609020204030204" pitchFamily="49" charset="0"/>
+              </a:rPr>
+              <a:t>script</a:t>
+            </a:r>
+            <a:r>
+              <a:rPr lang="pt-BR" sz="1600" dirty="0">
+                <a:latin typeface="Consolas" panose="020B0609020204030204" pitchFamily="49" charset="0"/>
+              </a:rPr>
+              <a:t>&gt;</a:t>
+            </a:r>
+          </a:p>
+          <a:p>
+            <a:r>
+              <a:rPr lang="pt-BR" sz="1600" dirty="0">
+                <a:solidFill>
+                  <a:schemeClr val="tx1">
+                    <a:lumMod val="50000"/>
+                    <a:lumOff val="50000"/>
+                  </a:schemeClr>
+                </a:solidFill>
+                <a:latin typeface="Consolas" panose="020B0609020204030204" pitchFamily="49" charset="0"/>
+              </a:rPr>
+              <a:t>2		</a:t>
+            </a:r>
+            <a:r>
+              <a:rPr lang="pt-BR" sz="1600" dirty="0">
+                <a:solidFill>
+                  <a:srgbClr val="FF0000"/>
+                </a:solidFill>
+                <a:latin typeface="Consolas" panose="020B0609020204030204" pitchFamily="49" charset="0"/>
+              </a:rPr>
+              <a:t>if</a:t>
+            </a:r>
+            <a:r>
+              <a:rPr lang="pt-BR" sz="1600" dirty="0">
+                <a:latin typeface="Consolas" panose="020B0609020204030204" pitchFamily="49" charset="0"/>
+              </a:rPr>
+              <a:t> (‘serviceWorker’ </a:t>
+            </a:r>
+            <a:r>
+              <a:rPr lang="pt-BR" sz="1600" dirty="0">
+                <a:solidFill>
+                  <a:srgbClr val="FF0000"/>
+                </a:solidFill>
+                <a:latin typeface="Consolas" panose="020B0609020204030204" pitchFamily="49" charset="0"/>
+              </a:rPr>
+              <a:t>in</a:t>
+            </a:r>
+            <a:r>
+              <a:rPr lang="pt-BR" sz="1600" dirty="0">
+                <a:latin typeface="Consolas" panose="020B0609020204030204" pitchFamily="49" charset="0"/>
+              </a:rPr>
+              <a:t> navigator) {</a:t>
+            </a:r>
+          </a:p>
+          <a:p>
+            <a:r>
+              <a:rPr lang="pt-BR" sz="1600" dirty="0">
+                <a:solidFill>
+                  <a:schemeClr val="tx1">
+                    <a:lumMod val="50000"/>
+                    <a:lumOff val="50000"/>
+                  </a:schemeClr>
+                </a:solidFill>
+                <a:latin typeface="Consolas" panose="020B0609020204030204" pitchFamily="49" charset="0"/>
+              </a:rPr>
+              <a:t>3			</a:t>
+            </a:r>
+            <a:r>
+              <a:rPr lang="pt-BR" sz="1600" dirty="0">
+                <a:solidFill>
+                  <a:schemeClr val="tx1"/>
+                </a:solidFill>
+                <a:latin typeface="Consolas" panose="020B0609020204030204" pitchFamily="49" charset="0"/>
+              </a:rPr>
+              <a:t>navigator.</a:t>
+            </a:r>
+            <a:r>
+              <a:rPr lang="pt-BR" sz="1600" dirty="0">
+                <a:solidFill>
+                  <a:srgbClr val="0070C0"/>
+                </a:solidFill>
+                <a:latin typeface="Consolas" panose="020B0609020204030204" pitchFamily="49" charset="0"/>
+              </a:rPr>
+              <a:t>serviceWorker</a:t>
+            </a:r>
+            <a:r>
+              <a:rPr lang="pt-BR" sz="1600" dirty="0">
+                <a:solidFill>
+                  <a:schemeClr val="tx1"/>
+                </a:solidFill>
+                <a:latin typeface="Consolas" panose="020B0609020204030204" pitchFamily="49" charset="0"/>
+              </a:rPr>
+              <a:t>.</a:t>
+            </a:r>
+            <a:r>
+              <a:rPr lang="pt-BR" sz="1600" dirty="0">
+                <a:solidFill>
+                  <a:srgbClr val="7030A0"/>
+                </a:solidFill>
+                <a:latin typeface="Consolas" panose="020B0609020204030204" pitchFamily="49" charset="0"/>
+              </a:rPr>
+              <a:t>register</a:t>
+            </a:r>
+            <a:r>
+              <a:rPr lang="pt-BR" sz="1600" dirty="0">
+                <a:solidFill>
+                  <a:schemeClr val="tx1"/>
+                </a:solidFill>
+                <a:latin typeface="Consolas" panose="020B0609020204030204" pitchFamily="49" charset="0"/>
+              </a:rPr>
+              <a:t>(‘/sw.js’)</a:t>
+            </a:r>
+          </a:p>
+          <a:p>
+            <a:r>
+              <a:rPr lang="pt-BR" sz="1600" dirty="0">
+                <a:solidFill>
+                  <a:schemeClr val="tx1">
+                    <a:lumMod val="50000"/>
+                    <a:lumOff val="50000"/>
+                  </a:schemeClr>
+                </a:solidFill>
+                <a:latin typeface="Consolas" panose="020B0609020204030204" pitchFamily="49" charset="0"/>
+              </a:rPr>
+              <a:t>4</a:t>
+            </a:r>
+            <a:r>
+              <a:rPr lang="pt-BR" sz="1600" dirty="0">
+                <a:latin typeface="Consolas" panose="020B0609020204030204" pitchFamily="49" charset="0"/>
+              </a:rPr>
+              <a:t>				.</a:t>
+            </a:r>
+            <a:r>
+              <a:rPr lang="pt-BR" sz="1600" dirty="0">
+                <a:solidFill>
+                  <a:srgbClr val="7030A0"/>
+                </a:solidFill>
+                <a:latin typeface="Consolas" panose="020B0609020204030204" pitchFamily="49" charset="0"/>
+              </a:rPr>
+              <a:t>then</a:t>
+            </a:r>
+            <a:r>
+              <a:rPr lang="pt-BR" sz="1600" dirty="0">
+                <a:solidFill>
+                  <a:schemeClr val="tx1"/>
+                </a:solidFill>
+                <a:latin typeface="Consolas" panose="020B0609020204030204" pitchFamily="49" charset="0"/>
+              </a:rPr>
+              <a:t>(</a:t>
+            </a:r>
+            <a:r>
+              <a:rPr lang="pt-BR" sz="1600" dirty="0">
+                <a:solidFill>
+                  <a:srgbClr val="FF0000"/>
+                </a:solidFill>
+                <a:latin typeface="Consolas" panose="020B0609020204030204" pitchFamily="49" charset="0"/>
+              </a:rPr>
+              <a:t>function </a:t>
+            </a:r>
+            <a:r>
+              <a:rPr lang="pt-BR" sz="1600" dirty="0">
+                <a:solidFill>
+                  <a:schemeClr val="tx1"/>
+                </a:solidFill>
+                <a:latin typeface="Consolas" panose="020B0609020204030204" pitchFamily="49" charset="0"/>
+              </a:rPr>
+              <a:t>() {</a:t>
+            </a:r>
+          </a:p>
+          <a:p>
+            <a:r>
+              <a:rPr lang="pt-BR" sz="1600" dirty="0">
+                <a:solidFill>
+                  <a:schemeClr val="tx1">
+                    <a:lumMod val="50000"/>
+                    <a:lumOff val="50000"/>
+                  </a:schemeClr>
+                </a:solidFill>
+                <a:latin typeface="Consolas" panose="020B0609020204030204" pitchFamily="49" charset="0"/>
+              </a:rPr>
+              <a:t>5</a:t>
+            </a:r>
+            <a:r>
+              <a:rPr lang="pt-BR" sz="1600" dirty="0">
+                <a:latin typeface="Consolas" panose="020B0609020204030204" pitchFamily="49" charset="0"/>
+              </a:rPr>
+              <a:t>			 		consol</a:t>
+            </a:r>
+            <a:r>
+              <a:rPr lang="pt-BR" sz="1600" dirty="0">
+                <a:solidFill>
+                  <a:schemeClr val="tx1"/>
+                </a:solidFill>
+                <a:latin typeface="Consolas" panose="020B0609020204030204" pitchFamily="49" charset="0"/>
+              </a:rPr>
+              <a:t>e.</a:t>
+            </a:r>
+            <a:r>
+              <a:rPr lang="pt-BR" sz="1600" dirty="0">
+                <a:latin typeface="Consolas" panose="020B0609020204030204" pitchFamily="49" charset="0"/>
+              </a:rPr>
+              <a:t>log(‘service worker registered’);</a:t>
+            </a:r>
+          </a:p>
+          <a:p>
+            <a:r>
+              <a:rPr lang="pt-BR" sz="1600" dirty="0">
+                <a:solidFill>
+                  <a:schemeClr val="tx1">
+                    <a:lumMod val="50000"/>
+                    <a:lumOff val="50000"/>
+                  </a:schemeClr>
+                </a:solidFill>
+                <a:latin typeface="Consolas" panose="020B0609020204030204" pitchFamily="49" charset="0"/>
+              </a:rPr>
+              <a:t>6 		</a:t>
+            </a:r>
+            <a:r>
+              <a:rPr lang="pt-BR" sz="1600" dirty="0">
+                <a:latin typeface="Consolas" panose="020B0609020204030204" pitchFamily="49" charset="0"/>
+              </a:rPr>
+              <a:t> 		})</a:t>
+            </a:r>
+            <a:endParaRPr lang="pt-BR" sz="1600" dirty="0">
+              <a:solidFill>
+                <a:schemeClr val="tx1">
+                  <a:lumMod val="50000"/>
+                  <a:lumOff val="50000"/>
+                </a:schemeClr>
+              </a:solidFill>
+              <a:latin typeface="Consolas" panose="020B0609020204030204" pitchFamily="49" charset="0"/>
+            </a:endParaRPr>
+          </a:p>
+          <a:p>
+            <a:r>
+              <a:rPr lang="pt-BR" sz="1600" dirty="0">
+                <a:solidFill>
+                  <a:schemeClr val="tx1">
+                    <a:lumMod val="50000"/>
+                    <a:lumOff val="50000"/>
+                  </a:schemeClr>
+                </a:solidFill>
+                <a:latin typeface="Consolas" panose="020B0609020204030204" pitchFamily="49" charset="0"/>
+              </a:rPr>
+              <a:t>7				</a:t>
+            </a:r>
+            <a:r>
+              <a:rPr lang="pt-BR" sz="1600" dirty="0">
+                <a:solidFill>
+                  <a:schemeClr val="tx1"/>
+                </a:solidFill>
+                <a:latin typeface="Consolas" panose="020B0609020204030204" pitchFamily="49" charset="0"/>
+              </a:rPr>
+              <a:t>.</a:t>
+            </a:r>
+            <a:r>
+              <a:rPr lang="pt-BR" sz="1600" dirty="0">
+                <a:solidFill>
+                  <a:srgbClr val="7030A0"/>
+                </a:solidFill>
+                <a:latin typeface="Consolas" panose="020B0609020204030204" pitchFamily="49" charset="0"/>
+              </a:rPr>
+              <a:t>catch</a:t>
+            </a:r>
+            <a:r>
+              <a:rPr lang="pt-BR" sz="1600" dirty="0">
+                <a:latin typeface="Consolas" panose="020B0609020204030204" pitchFamily="49" charset="0"/>
+              </a:rPr>
+              <a:t>(</a:t>
+            </a:r>
+            <a:r>
+              <a:rPr lang="pt-BR" sz="1600" dirty="0">
+                <a:solidFill>
+                  <a:srgbClr val="FF0000"/>
+                </a:solidFill>
+                <a:latin typeface="Consolas" panose="020B0609020204030204" pitchFamily="49" charset="0"/>
+              </a:rPr>
+              <a:t>function</a:t>
+            </a:r>
+            <a:r>
+              <a:rPr lang="pt-BR" sz="1600" dirty="0">
+                <a:latin typeface="Consolas" panose="020B0609020204030204" pitchFamily="49" charset="0"/>
+              </a:rPr>
+              <a:t> () {</a:t>
+            </a:r>
+            <a:endParaRPr lang="pt-BR" sz="1600" dirty="0">
+              <a:solidFill>
+                <a:schemeClr val="tx1">
+                  <a:lumMod val="50000"/>
+                  <a:lumOff val="50000"/>
+                </a:schemeClr>
+              </a:solidFill>
+              <a:latin typeface="Consolas" panose="020B0609020204030204" pitchFamily="49" charset="0"/>
+            </a:endParaRPr>
+          </a:p>
+          <a:p>
+            <a:r>
+              <a:rPr lang="pt-BR" sz="1600" dirty="0">
+                <a:solidFill>
+                  <a:schemeClr val="tx1">
+                    <a:lumMod val="50000"/>
+                    <a:lumOff val="50000"/>
+                  </a:schemeClr>
+                </a:solidFill>
+                <a:latin typeface="Consolas" panose="020B0609020204030204" pitchFamily="49" charset="0"/>
+              </a:rPr>
+              <a:t>8 			</a:t>
+            </a:r>
+            <a:r>
+              <a:rPr lang="pt-BR" sz="1600" dirty="0">
+                <a:latin typeface="Consolas" panose="020B0609020204030204" pitchFamily="49" charset="0"/>
+              </a:rPr>
+              <a:t> 		console.</a:t>
+            </a:r>
+            <a:r>
+              <a:rPr lang="pt-BR" sz="1600" dirty="0">
+                <a:solidFill>
+                  <a:srgbClr val="7030A0"/>
+                </a:solidFill>
+                <a:latin typeface="Consolas" panose="020B0609020204030204" pitchFamily="49" charset="0"/>
+              </a:rPr>
+              <a:t>warn</a:t>
+            </a:r>
+            <a:r>
+              <a:rPr lang="pt-BR" sz="1600" dirty="0">
+                <a:latin typeface="Consolas" panose="020B0609020204030204" pitchFamily="49" charset="0"/>
+              </a:rPr>
+              <a:t>(‘service worker failed’);</a:t>
+            </a:r>
+            <a:endParaRPr lang="pt-BR" sz="1600" dirty="0">
+              <a:solidFill>
+                <a:schemeClr val="tx1">
+                  <a:lumMod val="50000"/>
+                  <a:lumOff val="50000"/>
+                </a:schemeClr>
+              </a:solidFill>
+              <a:latin typeface="Consolas" panose="020B0609020204030204" pitchFamily="49" charset="0"/>
+            </a:endParaRPr>
+          </a:p>
+          <a:p>
+            <a:r>
+              <a:rPr lang="pt-BR" sz="1600" dirty="0">
+                <a:solidFill>
+                  <a:schemeClr val="tx1">
+                    <a:lumMod val="50000"/>
+                    <a:lumOff val="50000"/>
+                  </a:schemeClr>
+                </a:solidFill>
+                <a:latin typeface="Consolas" panose="020B0609020204030204" pitchFamily="49" charset="0"/>
+              </a:rPr>
+              <a:t>9 				</a:t>
+            </a:r>
+            <a:r>
+              <a:rPr lang="pt-BR" sz="1600" dirty="0">
+                <a:solidFill>
+                  <a:schemeClr val="tx1"/>
+                </a:solidFill>
+                <a:latin typeface="Consolas" panose="020B0609020204030204" pitchFamily="49" charset="0"/>
+              </a:rPr>
+              <a:t>});</a:t>
+            </a:r>
+          </a:p>
+          <a:p>
+            <a:r>
+              <a:rPr lang="pt-BR" sz="1600" dirty="0">
+                <a:solidFill>
+                  <a:schemeClr val="tx1">
+                    <a:lumMod val="50000"/>
+                    <a:lumOff val="50000"/>
+                  </a:schemeClr>
+                </a:solidFill>
+                <a:latin typeface="Consolas" panose="020B0609020204030204" pitchFamily="49" charset="0"/>
+              </a:rPr>
+              <a:t>10 		</a:t>
+            </a:r>
+            <a:r>
+              <a:rPr lang="pt-BR" sz="1600" dirty="0">
+                <a:solidFill>
+                  <a:schemeClr val="tx1"/>
+                </a:solidFill>
+                <a:latin typeface="Consolas" panose="020B0609020204030204" pitchFamily="49" charset="0"/>
+              </a:rPr>
+              <a:t>}</a:t>
+            </a:r>
+          </a:p>
+          <a:p>
+            <a:r>
+              <a:rPr lang="pt-BR" sz="1600" dirty="0">
+                <a:solidFill>
+                  <a:schemeClr val="tx1">
+                    <a:lumMod val="50000"/>
+                    <a:lumOff val="50000"/>
+                  </a:schemeClr>
+                </a:solidFill>
+                <a:latin typeface="Consolas" panose="020B0609020204030204" pitchFamily="49" charset="0"/>
+              </a:rPr>
+              <a:t>11	</a:t>
+            </a:r>
+            <a:r>
+              <a:rPr lang="pt-BR" sz="1600" dirty="0">
+                <a:latin typeface="Consolas" panose="020B0609020204030204" pitchFamily="49" charset="0"/>
+              </a:rPr>
+              <a:t>&lt;\</a:t>
+            </a:r>
+            <a:r>
+              <a:rPr lang="pt-BR" sz="1600" dirty="0">
+                <a:solidFill>
+                  <a:srgbClr val="00B050"/>
+                </a:solidFill>
+                <a:latin typeface="Consolas" panose="020B0609020204030204" pitchFamily="49" charset="0"/>
+              </a:rPr>
+              <a:t>script</a:t>
+            </a:r>
+            <a:r>
+              <a:rPr lang="pt-BR" sz="1600" dirty="0">
+                <a:latin typeface="Consolas" panose="020B0609020204030204" pitchFamily="49" charset="0"/>
+              </a:rPr>
+              <a:t>&gt;</a:t>
+            </a:r>
+          </a:p>
+        </p:txBody>
+      </p:sp>
+    </p:spTree>
+    <p:extLst>
+      <p:ext uri="{BB962C8B-B14F-4D97-AF65-F5344CB8AC3E}">
+        <p14:creationId xmlns:p14="http://schemas.microsoft.com/office/powerpoint/2010/main" val="1501474919"/>
+      </p:ext>
+    </p:extLst>
+  </p:cSld>
+  <p:clrMapOvr>
+    <a:masterClrMapping/>
+  </p:clrMapOvr>
+</p:sld>
+</file>
+
 <file path=ppt/slides/slide2.xml><?xml version="1.0" encoding="utf-8"?>
 <p:sld xmlns:a="http://schemas.openxmlformats.org/drawingml/2006/main" xmlns:r="http://schemas.openxmlformats.org/officeDocument/2006/relationships" xmlns:p="http://schemas.openxmlformats.org/presentationml/2006/main">
   <p:cSld>
@@ -6160,6 +8131,481 @@
     <p:extLst>
       <p:ext uri="{BB962C8B-B14F-4D97-AF65-F5344CB8AC3E}">
         <p14:creationId xmlns:p14="http://schemas.microsoft.com/office/powerpoint/2010/main" val="761286011"/>
+      </p:ext>
+    </p:extLst>
+  </p:cSld>
+  <p:clrMapOvr>
+    <a:masterClrMapping/>
+  </p:clrMapOvr>
+</p:sld>
+</file>
+
+<file path=ppt/slides/slide20.xml><?xml version="1.0" encoding="utf-8"?>
+<p:sld xmlns:a="http://schemas.openxmlformats.org/drawingml/2006/main" xmlns:r="http://schemas.openxmlformats.org/officeDocument/2006/relationships" xmlns:p="http://schemas.openxmlformats.org/presentationml/2006/main">
+  <p:cSld>
+    <p:spTree>
+      <p:nvGrpSpPr>
+        <p:cNvPr id="1" name=""/>
+        <p:cNvGrpSpPr/>
+        <p:nvPr/>
+      </p:nvGrpSpPr>
+      <p:grpSpPr>
+        <a:xfrm>
+          <a:off x="0" y="0"/>
+          <a:ext cx="0" cy="0"/>
+          <a:chOff x="0" y="0"/>
+          <a:chExt cx="0" cy="0"/>
+        </a:xfrm>
+      </p:grpSpPr>
+      <p:sp>
+        <p:nvSpPr>
+          <p:cNvPr id="2" name="Título 1">
+            <a:extLst>
+              <a:ext uri="{FF2B5EF4-FFF2-40B4-BE49-F238E27FC236}">
+                <a16:creationId xmlns:a16="http://schemas.microsoft.com/office/drawing/2014/main" id="{F7649200-3852-7866-2E3C-AB07108150A8}"/>
+              </a:ext>
+            </a:extLst>
+          </p:cNvPr>
+          <p:cNvSpPr>
+            <a:spLocks noGrp="1"/>
+          </p:cNvSpPr>
+          <p:nvPr>
+            <p:ph type="title"/>
+          </p:nvPr>
+        </p:nvSpPr>
+        <p:spPr/>
+        <p:txBody>
+          <a:bodyPr/>
+          <a:lstStyle/>
+          <a:p>
+            <a:r>
+              <a:rPr lang="pt-BR" dirty="0"/>
+              <a:t>Transformando um</a:t>
+            </a:r>
+            <a:r>
+              <a:rPr lang="pt-BR" i="1" dirty="0"/>
+              <a:t> site</a:t>
+            </a:r>
+            <a:r>
+              <a:rPr lang="pt-BR" dirty="0"/>
+              <a:t> em um </a:t>
+            </a:r>
+            <a:r>
+              <a:rPr lang="pt-BR" dirty="0" err="1"/>
+              <a:t>WebApp</a:t>
+            </a:r>
+            <a:endParaRPr lang="pt-BR" sz="2400" i="1" dirty="0"/>
+          </a:p>
+        </p:txBody>
+      </p:sp>
+      <p:sp>
+        <p:nvSpPr>
+          <p:cNvPr id="3" name="Espaço Reservado para Conteúdo 2">
+            <a:extLst>
+              <a:ext uri="{FF2B5EF4-FFF2-40B4-BE49-F238E27FC236}">
+                <a16:creationId xmlns:a16="http://schemas.microsoft.com/office/drawing/2014/main" id="{BC621189-6CC5-D3DF-91C1-80746A497F29}"/>
+              </a:ext>
+            </a:extLst>
+          </p:cNvPr>
+          <p:cNvSpPr>
+            <a:spLocks noGrp="1"/>
+          </p:cNvSpPr>
+          <p:nvPr>
+            <p:ph idx="1"/>
+          </p:nvPr>
+        </p:nvSpPr>
+        <p:spPr>
+          <a:xfrm>
+            <a:off x="1097280" y="1896397"/>
+            <a:ext cx="10058400" cy="4023360"/>
+          </a:xfrm>
+        </p:spPr>
+        <p:txBody>
+          <a:bodyPr>
+            <a:normAutofit/>
+          </a:bodyPr>
+          <a:lstStyle/>
+          <a:p>
+            <a:pPr marL="0" indent="0">
+              <a:buNone/>
+            </a:pPr>
+            <a:r>
+              <a:rPr lang="pt-BR" sz="2400" dirty="0"/>
+              <a:t>Os passos que observamos durante essa aula permitem que o </a:t>
+            </a:r>
+            <a:r>
+              <a:rPr lang="pt-BR" sz="2400" i="1" dirty="0"/>
+              <a:t>site</a:t>
+            </a:r>
+            <a:r>
+              <a:rPr lang="pt-BR" sz="2400" dirty="0"/>
+              <a:t> responsivo seja transformado em um aplicativo, mas não são os únicos passos.</a:t>
+            </a:r>
+          </a:p>
+          <a:p>
+            <a:pPr marL="0" indent="0">
+              <a:buNone/>
+            </a:pPr>
+            <a:r>
+              <a:rPr lang="pt-BR" sz="2400" dirty="0"/>
+              <a:t>Eles permitirão instalar o aplicativo em um dispositivo, que exibirá: </a:t>
+            </a:r>
+          </a:p>
+          <a:p>
+            <a:pPr>
+              <a:buFont typeface="Wingdings" panose="05000000000000000000" pitchFamily="2" charset="2"/>
+              <a:buChar char="Ø"/>
+            </a:pPr>
+            <a:r>
+              <a:rPr lang="pt-BR" sz="2400" dirty="0"/>
+              <a:t> Página de apresentação, </a:t>
+            </a:r>
+          </a:p>
+          <a:p>
+            <a:pPr>
+              <a:buFont typeface="Wingdings" panose="05000000000000000000" pitchFamily="2" charset="2"/>
+              <a:buChar char="Ø"/>
+            </a:pPr>
+            <a:r>
+              <a:rPr lang="pt-BR" sz="2400" dirty="0"/>
+              <a:t> Icone para o aplicativo,</a:t>
+            </a:r>
+          </a:p>
+          <a:p>
+            <a:pPr>
+              <a:buFont typeface="Wingdings" panose="05000000000000000000" pitchFamily="2" charset="2"/>
+              <a:buChar char="Ø"/>
+            </a:pPr>
+            <a:r>
+              <a:rPr lang="pt-BR" sz="2400" dirty="0"/>
+              <a:t> Disponibilidade mesmo </a:t>
+            </a:r>
+            <a:r>
+              <a:rPr lang="pt-BR" sz="2400" i="1" dirty="0"/>
+              <a:t>off-line</a:t>
+            </a:r>
+            <a:r>
+              <a:rPr lang="pt-BR" sz="2400" dirty="0"/>
+              <a:t>.</a:t>
+            </a:r>
+          </a:p>
+        </p:txBody>
+      </p:sp>
+    </p:spTree>
+    <p:extLst>
+      <p:ext uri="{BB962C8B-B14F-4D97-AF65-F5344CB8AC3E}">
+        <p14:creationId xmlns:p14="http://schemas.microsoft.com/office/powerpoint/2010/main" val="1743049629"/>
+      </p:ext>
+    </p:extLst>
+  </p:cSld>
+  <p:clrMapOvr>
+    <a:masterClrMapping/>
+  </p:clrMapOvr>
+</p:sld>
+</file>
+
+<file path=ppt/slides/slide21.xml><?xml version="1.0" encoding="utf-8"?>
+<p:sld xmlns:a="http://schemas.openxmlformats.org/drawingml/2006/main" xmlns:r="http://schemas.openxmlformats.org/officeDocument/2006/relationships" xmlns:p="http://schemas.openxmlformats.org/presentationml/2006/main">
+  <p:cSld>
+    <p:spTree>
+      <p:nvGrpSpPr>
+        <p:cNvPr id="1" name=""/>
+        <p:cNvGrpSpPr/>
+        <p:nvPr/>
+      </p:nvGrpSpPr>
+      <p:grpSpPr>
+        <a:xfrm>
+          <a:off x="0" y="0"/>
+          <a:ext cx="0" cy="0"/>
+          <a:chOff x="0" y="0"/>
+          <a:chExt cx="0" cy="0"/>
+        </a:xfrm>
+      </p:grpSpPr>
+      <p:sp>
+        <p:nvSpPr>
+          <p:cNvPr id="2" name="Título 1">
+            <a:extLst>
+              <a:ext uri="{FF2B5EF4-FFF2-40B4-BE49-F238E27FC236}">
+                <a16:creationId xmlns:a16="http://schemas.microsoft.com/office/drawing/2014/main" id="{F7649200-3852-7866-2E3C-AB07108150A8}"/>
+              </a:ext>
+            </a:extLst>
+          </p:cNvPr>
+          <p:cNvSpPr>
+            <a:spLocks noGrp="1"/>
+          </p:cNvSpPr>
+          <p:nvPr>
+            <p:ph type="title"/>
+          </p:nvPr>
+        </p:nvSpPr>
+        <p:spPr/>
+        <p:txBody>
+          <a:bodyPr/>
+          <a:lstStyle/>
+          <a:p>
+            <a:r>
+              <a:rPr lang="pt-BR" dirty="0"/>
+              <a:t>Transformando um</a:t>
+            </a:r>
+            <a:r>
+              <a:rPr lang="pt-BR" i="1" dirty="0"/>
+              <a:t> site</a:t>
+            </a:r>
+            <a:r>
+              <a:rPr lang="pt-BR" dirty="0"/>
+              <a:t> em um </a:t>
+            </a:r>
+            <a:r>
+              <a:rPr lang="pt-BR" dirty="0" err="1"/>
+              <a:t>WebApp</a:t>
+            </a:r>
+            <a:endParaRPr lang="pt-BR" sz="2400" i="1" dirty="0"/>
+          </a:p>
+        </p:txBody>
+      </p:sp>
+      <p:sp>
+        <p:nvSpPr>
+          <p:cNvPr id="3" name="Espaço Reservado para Conteúdo 2">
+            <a:extLst>
+              <a:ext uri="{FF2B5EF4-FFF2-40B4-BE49-F238E27FC236}">
+                <a16:creationId xmlns:a16="http://schemas.microsoft.com/office/drawing/2014/main" id="{BC621189-6CC5-D3DF-91C1-80746A497F29}"/>
+              </a:ext>
+            </a:extLst>
+          </p:cNvPr>
+          <p:cNvSpPr>
+            <a:spLocks noGrp="1"/>
+          </p:cNvSpPr>
+          <p:nvPr>
+            <p:ph idx="1"/>
+          </p:nvPr>
+        </p:nvSpPr>
+        <p:spPr>
+          <a:xfrm>
+            <a:off x="1097280" y="1896397"/>
+            <a:ext cx="10058400" cy="4023360"/>
+          </a:xfrm>
+        </p:spPr>
+        <p:txBody>
+          <a:bodyPr>
+            <a:normAutofit/>
+          </a:bodyPr>
+          <a:lstStyle/>
+          <a:p>
+            <a:pPr marL="0" indent="0">
+              <a:buNone/>
+            </a:pPr>
+            <a:r>
+              <a:rPr lang="pt-BR" sz="2400" dirty="0"/>
+              <a:t>Para que um </a:t>
+            </a:r>
+            <a:r>
+              <a:rPr lang="pt-BR" sz="2400" dirty="0" err="1"/>
+              <a:t>WebApp</a:t>
+            </a:r>
+            <a:r>
+              <a:rPr lang="pt-BR" sz="2400" dirty="0"/>
+              <a:t> seja comparado com um aplicativo nativo, é necessário instalar outros elementos, como por exemplo, as </a:t>
+            </a:r>
+            <a:r>
+              <a:rPr lang="pt-BR" sz="2400" i="1" dirty="0" err="1"/>
+              <a:t>push</a:t>
+            </a:r>
+            <a:r>
+              <a:rPr lang="pt-BR" sz="2400" i="1" dirty="0"/>
+              <a:t> </a:t>
+            </a:r>
+            <a:r>
+              <a:rPr lang="pt-BR" sz="2400" i="1" dirty="0" err="1"/>
+              <a:t>notifications</a:t>
+            </a:r>
+            <a:r>
+              <a:rPr lang="pt-BR" sz="2400" dirty="0"/>
+              <a:t>, interação com a Câmera ou o GPS.</a:t>
+            </a:r>
+          </a:p>
+          <a:p>
+            <a:pPr marL="0" indent="0">
+              <a:buNone/>
+            </a:pPr>
+            <a:r>
+              <a:rPr lang="pt-BR" sz="2400" dirty="0"/>
+              <a:t>Lembre-se que, um bom PWA precisa ter:</a:t>
+            </a:r>
+          </a:p>
+          <a:p>
+            <a:pPr>
+              <a:buFont typeface="Wingdings" panose="05000000000000000000" pitchFamily="2" charset="2"/>
+              <a:buChar char="Ø"/>
+            </a:pPr>
+            <a:r>
+              <a:rPr lang="pt-BR" sz="2400" dirty="0"/>
+              <a:t> Bom desenvolvimento </a:t>
+            </a:r>
+            <a:r>
+              <a:rPr lang="pt-BR" sz="2400" i="1" dirty="0" err="1"/>
+              <a:t>backend</a:t>
+            </a:r>
+            <a:r>
+              <a:rPr lang="pt-BR" sz="2400" dirty="0"/>
+              <a:t> e </a:t>
+            </a:r>
+            <a:r>
+              <a:rPr lang="pt-BR" sz="2400" i="1" dirty="0" err="1"/>
+              <a:t>frontend</a:t>
+            </a:r>
+            <a:r>
+              <a:rPr lang="pt-BR" sz="2400" dirty="0"/>
+              <a:t>;</a:t>
+            </a:r>
+          </a:p>
+          <a:p>
+            <a:pPr>
+              <a:buFont typeface="Wingdings" panose="05000000000000000000" pitchFamily="2" charset="2"/>
+              <a:buChar char="Ø"/>
+            </a:pPr>
+            <a:r>
+              <a:rPr lang="pt-BR" sz="2400" dirty="0"/>
+              <a:t> Basear o </a:t>
+            </a:r>
+            <a:r>
+              <a:rPr lang="pt-BR" sz="2400" i="1" dirty="0" err="1"/>
+              <a:t>backend</a:t>
+            </a:r>
+            <a:r>
+              <a:rPr lang="pt-BR" sz="2400" dirty="0"/>
+              <a:t> em serviços.</a:t>
+            </a:r>
+          </a:p>
+        </p:txBody>
+      </p:sp>
+    </p:spTree>
+    <p:extLst>
+      <p:ext uri="{BB962C8B-B14F-4D97-AF65-F5344CB8AC3E}">
+        <p14:creationId xmlns:p14="http://schemas.microsoft.com/office/powerpoint/2010/main" val="97338483"/>
+      </p:ext>
+    </p:extLst>
+  </p:cSld>
+  <p:clrMapOvr>
+    <a:masterClrMapping/>
+  </p:clrMapOvr>
+</p:sld>
+</file>
+
+<file path=ppt/slides/slide22.xml><?xml version="1.0" encoding="utf-8"?>
+<p:sld xmlns:a="http://schemas.openxmlformats.org/drawingml/2006/main" xmlns:r="http://schemas.openxmlformats.org/officeDocument/2006/relationships" xmlns:p="http://schemas.openxmlformats.org/presentationml/2006/main">
+  <p:cSld>
+    <p:spTree>
+      <p:nvGrpSpPr>
+        <p:cNvPr id="1" name=""/>
+        <p:cNvGrpSpPr/>
+        <p:nvPr/>
+      </p:nvGrpSpPr>
+      <p:grpSpPr>
+        <a:xfrm>
+          <a:off x="0" y="0"/>
+          <a:ext cx="0" cy="0"/>
+          <a:chOff x="0" y="0"/>
+          <a:chExt cx="0" cy="0"/>
+        </a:xfrm>
+      </p:grpSpPr>
+      <p:sp>
+        <p:nvSpPr>
+          <p:cNvPr id="2" name="Título 1">
+            <a:extLst>
+              <a:ext uri="{FF2B5EF4-FFF2-40B4-BE49-F238E27FC236}">
+                <a16:creationId xmlns:a16="http://schemas.microsoft.com/office/drawing/2014/main" id="{F7649200-3852-7866-2E3C-AB07108150A8}"/>
+              </a:ext>
+            </a:extLst>
+          </p:cNvPr>
+          <p:cNvSpPr>
+            <a:spLocks noGrp="1"/>
+          </p:cNvSpPr>
+          <p:nvPr>
+            <p:ph type="title"/>
+          </p:nvPr>
+        </p:nvSpPr>
+        <p:spPr/>
+        <p:txBody>
+          <a:bodyPr/>
+          <a:lstStyle/>
+          <a:p>
+            <a:r>
+              <a:rPr lang="pt-BR" dirty="0"/>
+              <a:t>Finalizando a nossa apresentação</a:t>
+            </a:r>
+            <a:endParaRPr lang="pt-BR" sz="2400" i="1" dirty="0"/>
+          </a:p>
+        </p:txBody>
+      </p:sp>
+      <p:sp>
+        <p:nvSpPr>
+          <p:cNvPr id="3" name="Espaço Reservado para Conteúdo 2">
+            <a:extLst>
+              <a:ext uri="{FF2B5EF4-FFF2-40B4-BE49-F238E27FC236}">
+                <a16:creationId xmlns:a16="http://schemas.microsoft.com/office/drawing/2014/main" id="{BC621189-6CC5-D3DF-91C1-80746A497F29}"/>
+              </a:ext>
+            </a:extLst>
+          </p:cNvPr>
+          <p:cNvSpPr>
+            <a:spLocks noGrp="1"/>
+          </p:cNvSpPr>
+          <p:nvPr>
+            <p:ph idx="1"/>
+          </p:nvPr>
+        </p:nvSpPr>
+        <p:spPr>
+          <a:xfrm>
+            <a:off x="1097280" y="1896397"/>
+            <a:ext cx="10058400" cy="4023360"/>
+          </a:xfrm>
+        </p:spPr>
+        <p:txBody>
+          <a:bodyPr>
+            <a:normAutofit/>
+          </a:bodyPr>
+          <a:lstStyle/>
+          <a:p>
+            <a:pPr marL="0" indent="0">
+              <a:buNone/>
+            </a:pPr>
+            <a:r>
+              <a:rPr lang="pt-BR" sz="2400" dirty="0"/>
+              <a:t>Lembre-se:</a:t>
+            </a:r>
+          </a:p>
+          <a:p>
+            <a:pPr>
+              <a:buFont typeface="Wingdings" panose="05000000000000000000" pitchFamily="2" charset="2"/>
+              <a:buChar char="Ø"/>
+            </a:pPr>
+            <a:r>
+              <a:rPr lang="pt-BR" sz="2400" dirty="0"/>
+              <a:t> Este conteúdo foi realizado utilizando a apostila 5. Se houver dúvidas, leia a apostila e o conteúdo adicional a ela.</a:t>
+            </a:r>
+          </a:p>
+          <a:p>
+            <a:pPr>
+              <a:buFont typeface="Wingdings" panose="05000000000000000000" pitchFamily="2" charset="2"/>
+              <a:buChar char="Ø"/>
+            </a:pPr>
+            <a:r>
+              <a:rPr lang="pt-BR" sz="2400" dirty="0"/>
+              <a:t> Não esqueça de responder as questões que serão enviadas pelo </a:t>
+            </a:r>
+            <a:r>
+              <a:rPr lang="pt-BR" sz="2400" dirty="0" err="1"/>
+              <a:t>whatsapp</a:t>
+            </a:r>
+            <a:r>
+              <a:rPr lang="pt-BR" sz="2400" dirty="0"/>
+              <a:t>.</a:t>
+            </a:r>
+          </a:p>
+        </p:txBody>
+      </p:sp>
+    </p:spTree>
+    <p:extLst>
+      <p:ext uri="{BB962C8B-B14F-4D97-AF65-F5344CB8AC3E}">
+        <p14:creationId xmlns:p14="http://schemas.microsoft.com/office/powerpoint/2010/main" val="3239331896"/>
       </p:ext>
     </p:extLst>
   </p:cSld>
@@ -7048,11 +9494,7 @@
             </a:r>
             <a:r>
               <a:rPr lang="pt-BR" sz="2200" i="1" dirty="0"/>
-              <a:t>Service </a:t>
-            </a:r>
-            <a:r>
-              <a:rPr lang="pt-BR" sz="2200" i="1" dirty="0" err="1"/>
-              <a:t>Worker</a:t>
+              <a:t>Service Worker</a:t>
             </a:r>
             <a:r>
               <a:rPr lang="pt-BR" sz="2200" dirty="0"/>

</xml_diff>